<commit_message>
presentaation page 2 added
</commit_message>
<xml_diff>
--- a/Python_Training_XXXXXX_V1.pptx
+++ b/Python_Training_XXXXXX_V1.pptx
@@ -6,14 +6,15 @@
   </p:sldMasterIdLst>
   <p:sldIdLst>
     <p:sldId id="256" r:id="rId2"/>
-    <p:sldId id="257" r:id="rId3"/>
-    <p:sldId id="258" r:id="rId4"/>
-    <p:sldId id="264" r:id="rId5"/>
-    <p:sldId id="259" r:id="rId6"/>
-    <p:sldId id="263" r:id="rId7"/>
-    <p:sldId id="260" r:id="rId8"/>
-    <p:sldId id="261" r:id="rId9"/>
-    <p:sldId id="262" r:id="rId10"/>
+    <p:sldId id="265" r:id="rId3"/>
+    <p:sldId id="257" r:id="rId4"/>
+    <p:sldId id="258" r:id="rId5"/>
+    <p:sldId id="264" r:id="rId6"/>
+    <p:sldId id="259" r:id="rId7"/>
+    <p:sldId id="263" r:id="rId8"/>
+    <p:sldId id="260" r:id="rId9"/>
+    <p:sldId id="261" r:id="rId10"/>
+    <p:sldId id="262" r:id="rId11"/>
   </p:sldIdLst>
   <p:sldSz cx="12192000" cy="6858000"/>
   <p:notesSz cx="6858000" cy="9144000"/>
@@ -123,7 +124,7 @@
 <file path=ppt/revisionInfo.xml><?xml version="1.0" encoding="utf-8"?>
 <p1510:revInfo xmlns:a="http://schemas.openxmlformats.org/drawingml/2006/main" xmlns:r="http://schemas.openxmlformats.org/officeDocument/2006/relationships" xmlns:p1510="http://schemas.microsoft.com/office/powerpoint/2015/10/main">
   <p1510:revLst>
-    <p1510:client id="{072CD353-33CC-4253-AE63-82F7FD1B1DC8}" v="1" dt="2024-02-12T09:44:57.807"/>
+    <p1510:client id="{072CD353-33CC-4253-AE63-82F7FD1B1DC8}" v="3" dt="2024-02-15T12:49:13.819"/>
   </p1510:revLst>
 </p1510:revInfo>
 </file>
@@ -132,8 +133,8 @@
 <pc:chgInfo xmlns:a="http://schemas.openxmlformats.org/drawingml/2006/main" xmlns:r="http://schemas.openxmlformats.org/officeDocument/2006/relationships" xmlns:ac="http://schemas.microsoft.com/office/drawing/2013/main/command" xmlns:pc="http://schemas.microsoft.com/office/powerpoint/2013/main/command">
   <pc:docChgLst>
     <pc:chgData name="Moro, Marco" userId="d7bcd177-0ddd-42e9-8665-046e17e9d9ac" providerId="ADAL" clId="{072CD353-33CC-4253-AE63-82F7FD1B1DC8}"/>
-    <pc:docChg chg="custSel addSld delSld modSld">
-      <pc:chgData name="Moro, Marco" userId="d7bcd177-0ddd-42e9-8665-046e17e9d9ac" providerId="ADAL" clId="{072CD353-33CC-4253-AE63-82F7FD1B1DC8}" dt="2024-02-12T09:53:37.633" v="292" actId="20577"/>
+    <pc:docChg chg="undo custSel addSld delSld modSld">
+      <pc:chgData name="Moro, Marco" userId="d7bcd177-0ddd-42e9-8665-046e17e9d9ac" providerId="ADAL" clId="{072CD353-33CC-4253-AE63-82F7FD1B1DC8}" dt="2024-02-15T12:49:28.775" v="338" actId="255"/>
       <pc:docMkLst>
         <pc:docMk/>
       </pc:docMkLst>
@@ -179,6 +180,45 @@
             <pc:docMk/>
             <pc:sldMk cId="1608759840" sldId="264"/>
             <ac:spMk id="3" creationId="{25E93778-EF58-B193-75C7-BE37D5F2BB00}"/>
+          </ac:spMkLst>
+        </pc:spChg>
+      </pc:sldChg>
+      <pc:sldChg chg="addSp delSp modSp new mod">
+        <pc:chgData name="Moro, Marco" userId="d7bcd177-0ddd-42e9-8665-046e17e9d9ac" providerId="ADAL" clId="{072CD353-33CC-4253-AE63-82F7FD1B1DC8}" dt="2024-02-15T12:49:28.775" v="338" actId="255"/>
+        <pc:sldMkLst>
+          <pc:docMk/>
+          <pc:sldMk cId="2991976468" sldId="265"/>
+        </pc:sldMkLst>
+        <pc:spChg chg="mod">
+          <ac:chgData name="Moro, Marco" userId="d7bcd177-0ddd-42e9-8665-046e17e9d9ac" providerId="ADAL" clId="{072CD353-33CC-4253-AE63-82F7FD1B1DC8}" dt="2024-02-15T12:47:59.208" v="327" actId="255"/>
+          <ac:spMkLst>
+            <pc:docMk/>
+            <pc:sldMk cId="2991976468" sldId="265"/>
+            <ac:spMk id="2" creationId="{00C3A169-C714-64B2-78AF-C8176E7CB955}"/>
+          </ac:spMkLst>
+        </pc:spChg>
+        <pc:spChg chg="add del mod">
+          <ac:chgData name="Moro, Marco" userId="d7bcd177-0ddd-42e9-8665-046e17e9d9ac" providerId="ADAL" clId="{072CD353-33CC-4253-AE63-82F7FD1B1DC8}" dt="2024-02-15T12:49:28.775" v="338" actId="255"/>
+          <ac:spMkLst>
+            <pc:docMk/>
+            <pc:sldMk cId="2991976468" sldId="265"/>
+            <ac:spMk id="3" creationId="{0FEC88D3-94B5-25B1-93ED-C6A2531CB077}"/>
+          </ac:spMkLst>
+        </pc:spChg>
+        <pc:spChg chg="add del mod">
+          <ac:chgData name="Moro, Marco" userId="d7bcd177-0ddd-42e9-8665-046e17e9d9ac" providerId="ADAL" clId="{072CD353-33CC-4253-AE63-82F7FD1B1DC8}" dt="2024-02-15T12:49:13.819" v="335"/>
+          <ac:spMkLst>
+            <pc:docMk/>
+            <pc:sldMk cId="2991976468" sldId="265"/>
+            <ac:spMk id="4" creationId="{9C6AE57F-2C9A-3F8C-33AB-78AD19C6460D}"/>
+          </ac:spMkLst>
+        </pc:spChg>
+        <pc:spChg chg="add del mod">
+          <ac:chgData name="Moro, Marco" userId="d7bcd177-0ddd-42e9-8665-046e17e9d9ac" providerId="ADAL" clId="{072CD353-33CC-4253-AE63-82F7FD1B1DC8}" dt="2024-02-15T12:49:12.860" v="333" actId="22"/>
+          <ac:spMkLst>
+            <pc:docMk/>
+            <pc:sldMk cId="2991976468" sldId="265"/>
+            <ac:spMk id="6" creationId="{4FB3F9F6-2C80-8561-DE65-018E0276473B}"/>
           </ac:spMkLst>
         </pc:spChg>
       </pc:sldChg>
@@ -336,7 +376,7 @@
           <a:p>
             <a:fld id="{3D8FED83-86F4-482A-91F0-A1EF509DC55C}" type="datetimeFigureOut">
               <a:rPr lang="en-GB" smtClean="0"/>
-              <a:t>12/02/2024</a:t>
+              <a:t>14/02/2024</a:t>
             </a:fld>
             <a:endParaRPr lang="en-GB"/>
           </a:p>
@@ -536,7 +576,7 @@
           <a:p>
             <a:fld id="{3D8FED83-86F4-482A-91F0-A1EF509DC55C}" type="datetimeFigureOut">
               <a:rPr lang="en-GB" smtClean="0"/>
-              <a:t>12/02/2024</a:t>
+              <a:t>14/02/2024</a:t>
             </a:fld>
             <a:endParaRPr lang="en-GB"/>
           </a:p>
@@ -746,7 +786,7 @@
           <a:p>
             <a:fld id="{3D8FED83-86F4-482A-91F0-A1EF509DC55C}" type="datetimeFigureOut">
               <a:rPr lang="en-GB" smtClean="0"/>
-              <a:t>12/02/2024</a:t>
+              <a:t>14/02/2024</a:t>
             </a:fld>
             <a:endParaRPr lang="en-GB"/>
           </a:p>
@@ -946,7 +986,7 @@
           <a:p>
             <a:fld id="{3D8FED83-86F4-482A-91F0-A1EF509DC55C}" type="datetimeFigureOut">
               <a:rPr lang="en-GB" smtClean="0"/>
-              <a:t>12/02/2024</a:t>
+              <a:t>14/02/2024</a:t>
             </a:fld>
             <a:endParaRPr lang="en-GB"/>
           </a:p>
@@ -1222,7 +1262,7 @@
           <a:p>
             <a:fld id="{3D8FED83-86F4-482A-91F0-A1EF509DC55C}" type="datetimeFigureOut">
               <a:rPr lang="en-GB" smtClean="0"/>
-              <a:t>12/02/2024</a:t>
+              <a:t>14/02/2024</a:t>
             </a:fld>
             <a:endParaRPr lang="en-GB"/>
           </a:p>
@@ -1490,7 +1530,7 @@
           <a:p>
             <a:fld id="{3D8FED83-86F4-482A-91F0-A1EF509DC55C}" type="datetimeFigureOut">
               <a:rPr lang="en-GB" smtClean="0"/>
-              <a:t>12/02/2024</a:t>
+              <a:t>14/02/2024</a:t>
             </a:fld>
             <a:endParaRPr lang="en-GB"/>
           </a:p>
@@ -1905,7 +1945,7 @@
           <a:p>
             <a:fld id="{3D8FED83-86F4-482A-91F0-A1EF509DC55C}" type="datetimeFigureOut">
               <a:rPr lang="en-GB" smtClean="0"/>
-              <a:t>12/02/2024</a:t>
+              <a:t>14/02/2024</a:t>
             </a:fld>
             <a:endParaRPr lang="en-GB"/>
           </a:p>
@@ -2047,7 +2087,7 @@
           <a:p>
             <a:fld id="{3D8FED83-86F4-482A-91F0-A1EF509DC55C}" type="datetimeFigureOut">
               <a:rPr lang="en-GB" smtClean="0"/>
-              <a:t>12/02/2024</a:t>
+              <a:t>14/02/2024</a:t>
             </a:fld>
             <a:endParaRPr lang="en-GB"/>
           </a:p>
@@ -2160,7 +2200,7 @@
           <a:p>
             <a:fld id="{3D8FED83-86F4-482A-91F0-A1EF509DC55C}" type="datetimeFigureOut">
               <a:rPr lang="en-GB" smtClean="0"/>
-              <a:t>12/02/2024</a:t>
+              <a:t>14/02/2024</a:t>
             </a:fld>
             <a:endParaRPr lang="en-GB"/>
           </a:p>
@@ -2473,7 +2513,7 @@
           <a:p>
             <a:fld id="{3D8FED83-86F4-482A-91F0-A1EF509DC55C}" type="datetimeFigureOut">
               <a:rPr lang="en-GB" smtClean="0"/>
-              <a:t>12/02/2024</a:t>
+              <a:t>14/02/2024</a:t>
             </a:fld>
             <a:endParaRPr lang="en-GB"/>
           </a:p>
@@ -2762,7 +2802,7 @@
           <a:p>
             <a:fld id="{3D8FED83-86F4-482A-91F0-A1EF509DC55C}" type="datetimeFigureOut">
               <a:rPr lang="en-GB" smtClean="0"/>
-              <a:t>12/02/2024</a:t>
+              <a:t>14/02/2024</a:t>
             </a:fld>
             <a:endParaRPr lang="en-GB"/>
           </a:p>
@@ -3005,7 +3045,7 @@
           <a:p>
             <a:fld id="{3D8FED83-86F4-482A-91F0-A1EF509DC55C}" type="datetimeFigureOut">
               <a:rPr lang="en-GB" smtClean="0"/>
-              <a:t>12/02/2024</a:t>
+              <a:t>14/02/2024</a:t>
             </a:fld>
             <a:endParaRPr lang="en-GB"/>
           </a:p>
@@ -10714,7 +10754,344 @@
 </p:sld>
 </file>
 
+<file path=ppt/slides/slide10.xml><?xml version="1.0" encoding="utf-8"?>
+<p:sld xmlns:a="http://schemas.openxmlformats.org/drawingml/2006/main" xmlns:r="http://schemas.openxmlformats.org/officeDocument/2006/relationships" xmlns:p="http://schemas.openxmlformats.org/presentationml/2006/main">
+  <p:cSld>
+    <p:spTree>
+      <p:nvGrpSpPr>
+        <p:cNvPr id="1" name=""/>
+        <p:cNvGrpSpPr/>
+        <p:nvPr/>
+      </p:nvGrpSpPr>
+      <p:grpSpPr>
+        <a:xfrm>
+          <a:off x="0" y="0"/>
+          <a:ext cx="0" cy="0"/>
+          <a:chOff x="0" y="0"/>
+          <a:chExt cx="0" cy="0"/>
+        </a:xfrm>
+      </p:grpSpPr>
+      <p:sp>
+        <p:nvSpPr>
+          <p:cNvPr id="2" name="Title 1">
+            <a:extLst>
+              <a:ext uri="{FF2B5EF4-FFF2-40B4-BE49-F238E27FC236}">
+                <a16:creationId xmlns:a16="http://schemas.microsoft.com/office/drawing/2014/main" id="{C1B588DC-9FE2-1808-7B45-01B05B2A7407}"/>
+              </a:ext>
+            </a:extLst>
+          </p:cNvPr>
+          <p:cNvSpPr>
+            <a:spLocks noGrp="1"/>
+          </p:cNvSpPr>
+          <p:nvPr>
+            <p:ph type="title"/>
+          </p:nvPr>
+        </p:nvSpPr>
+        <p:spPr/>
+        <p:txBody>
+          <a:bodyPr/>
+          <a:lstStyle/>
+          <a:p>
+            <a:r>
+              <a:rPr lang="en-US" dirty="0"/>
+              <a:t>String Data Type</a:t>
+            </a:r>
+            <a:endParaRPr lang="en-GB" dirty="0"/>
+          </a:p>
+        </p:txBody>
+      </p:sp>
+      <p:sp>
+        <p:nvSpPr>
+          <p:cNvPr id="3" name="Content Placeholder 2">
+            <a:extLst>
+              <a:ext uri="{FF2B5EF4-FFF2-40B4-BE49-F238E27FC236}">
+                <a16:creationId xmlns:a16="http://schemas.microsoft.com/office/drawing/2014/main" id="{A2FAB47A-24B8-F766-2880-341DFA7EC372}"/>
+              </a:ext>
+            </a:extLst>
+          </p:cNvPr>
+          <p:cNvSpPr>
+            <a:spLocks noGrp="1"/>
+          </p:cNvSpPr>
+          <p:nvPr>
+            <p:ph idx="1"/>
+          </p:nvPr>
+        </p:nvSpPr>
+        <p:spPr/>
+        <p:txBody>
+          <a:bodyPr/>
+          <a:lstStyle/>
+          <a:p>
+            <a:r>
+              <a:rPr lang="en-US" b="0" i="0" dirty="0">
+                <a:solidFill>
+                  <a:srgbClr val="4D5B7C"/>
+                </a:solidFill>
+                <a:effectLst/>
+                <a:latin typeface="Inter"/>
+              </a:rPr>
+              <a:t>The string is a sequence of characters. Python supports Unicode characters. Generally, strings are represented by either single or double-quotes.</a:t>
+            </a:r>
+          </a:p>
+          <a:p>
+            <a:endParaRPr lang="en-GB" dirty="0">
+              <a:solidFill>
+                <a:srgbClr val="4D5B7C"/>
+              </a:solidFill>
+              <a:latin typeface="Inter"/>
+            </a:endParaRPr>
+          </a:p>
+          <a:p>
+            <a:pPr marL="0" indent="0">
+              <a:buNone/>
+            </a:pPr>
+            <a:r>
+              <a:rPr lang="en-GB" sz="2000" b="0" i="0" dirty="0">
+                <a:effectLst/>
+              </a:rPr>
+              <a:t>name = "John Doe"   # this is a string example</a:t>
+            </a:r>
+          </a:p>
+          <a:p>
+            <a:pPr marL="0" indent="0">
+              <a:buNone/>
+            </a:pPr>
+            <a:r>
+              <a:rPr lang="en-GB" sz="2000" b="0" i="0" dirty="0">
+                <a:effectLst/>
+              </a:rPr>
+              <a:t>print(name)</a:t>
+            </a:r>
+          </a:p>
+          <a:p>
+            <a:pPr marL="0" indent="0">
+              <a:buNone/>
+            </a:pPr>
+            <a:endParaRPr lang="en-GB" sz="2000" b="0" i="0" dirty="0">
+              <a:effectLst/>
+            </a:endParaRPr>
+          </a:p>
+          <a:p>
+            <a:pPr marL="0" indent="0">
+              <a:buNone/>
+            </a:pPr>
+            <a:r>
+              <a:rPr lang="en-US" sz="2000" b="0" i="0" dirty="0">
+                <a:effectLst/>
+              </a:rPr>
+              <a:t>name = "John "   # String</a:t>
+            </a:r>
+          </a:p>
+          <a:p>
+            <a:pPr marL="0" indent="0">
+              <a:buNone/>
+            </a:pPr>
+            <a:r>
+              <a:rPr lang="en-US" sz="2000" b="0" i="0" dirty="0">
+                <a:effectLst/>
+              </a:rPr>
+              <a:t>age = 30              # Int </a:t>
+            </a:r>
+          </a:p>
+          <a:p>
+            <a:pPr marL="0" indent="0">
+              <a:buNone/>
+            </a:pPr>
+            <a:r>
+              <a:rPr lang="en-US" sz="2000" b="0" i="0" dirty="0">
+                <a:effectLst/>
+              </a:rPr>
+              <a:t>print(</a:t>
+            </a:r>
+            <a:r>
+              <a:rPr lang="en-US" sz="2000" b="0" i="0" dirty="0" err="1">
+                <a:effectLst/>
+              </a:rPr>
+              <a:t>f"Hello</a:t>
+            </a:r>
+            <a:r>
+              <a:rPr lang="en-US" sz="2000" b="0" i="0" dirty="0">
+                <a:effectLst/>
+              </a:rPr>
+              <a:t>, my name is {name} and I am {age} years old.")</a:t>
+            </a:r>
+            <a:endParaRPr lang="en-US" sz="2000" dirty="0"/>
+          </a:p>
+        </p:txBody>
+      </p:sp>
+    </p:spTree>
+    <p:extLst>
+      <p:ext uri="{BB962C8B-B14F-4D97-AF65-F5344CB8AC3E}">
+        <p14:creationId xmlns:p14="http://schemas.microsoft.com/office/powerpoint/2010/main" val="2572871167"/>
+      </p:ext>
+    </p:extLst>
+  </p:cSld>
+  <p:clrMapOvr>
+    <a:masterClrMapping/>
+  </p:clrMapOvr>
+</p:sld>
+</file>
+
 <file path=ppt/slides/slide2.xml><?xml version="1.0" encoding="utf-8"?>
+<p:sld xmlns:a="http://schemas.openxmlformats.org/drawingml/2006/main" xmlns:r="http://schemas.openxmlformats.org/officeDocument/2006/relationships" xmlns:p="http://schemas.openxmlformats.org/presentationml/2006/main">
+  <p:cSld>
+    <p:spTree>
+      <p:nvGrpSpPr>
+        <p:cNvPr id="1" name=""/>
+        <p:cNvGrpSpPr/>
+        <p:nvPr/>
+      </p:nvGrpSpPr>
+      <p:grpSpPr>
+        <a:xfrm>
+          <a:off x="0" y="0"/>
+          <a:ext cx="0" cy="0"/>
+          <a:chOff x="0" y="0"/>
+          <a:chExt cx="0" cy="0"/>
+        </a:xfrm>
+      </p:grpSpPr>
+      <p:sp>
+        <p:nvSpPr>
+          <p:cNvPr id="2" name="Title 1">
+            <a:extLst>
+              <a:ext uri="{FF2B5EF4-FFF2-40B4-BE49-F238E27FC236}">
+                <a16:creationId xmlns:a16="http://schemas.microsoft.com/office/drawing/2014/main" id="{00C3A169-C714-64B2-78AF-C8176E7CB955}"/>
+              </a:ext>
+            </a:extLst>
+          </p:cNvPr>
+          <p:cNvSpPr>
+            <a:spLocks noGrp="1"/>
+          </p:cNvSpPr>
+          <p:nvPr>
+            <p:ph type="title"/>
+          </p:nvPr>
+        </p:nvSpPr>
+        <p:spPr>
+          <a:xfrm>
+            <a:off x="831850" y="830510"/>
+            <a:ext cx="10515600" cy="1702965"/>
+          </a:xfrm>
+        </p:spPr>
+        <p:txBody>
+          <a:bodyPr>
+            <a:normAutofit/>
+          </a:bodyPr>
+          <a:lstStyle/>
+          <a:p>
+            <a:r>
+              <a:rPr lang="en-US" sz="4800" b="0" i="0" dirty="0">
+                <a:solidFill>
+                  <a:srgbClr val="4D5156"/>
+                </a:solidFill>
+                <a:effectLst/>
+                <a:latin typeface="Blackadder ITC" panose="04020505051007020D02" pitchFamily="82" charset="0"/>
+              </a:rPr>
+              <a:t>Literally </a:t>
+            </a:r>
+            <a:r>
+              <a:rPr lang="en-US" sz="4800" b="1" i="0" dirty="0">
+                <a:solidFill>
+                  <a:srgbClr val="5F6368"/>
+                </a:solidFill>
+                <a:effectLst/>
+                <a:latin typeface="Blackadder ITC" panose="04020505051007020D02" pitchFamily="82" charset="0"/>
+              </a:rPr>
+              <a:t>nothing is impossible. When there is a will</a:t>
+            </a:r>
+            <a:r>
+              <a:rPr lang="en-US" sz="4800" b="0" i="0" dirty="0">
+                <a:solidFill>
+                  <a:srgbClr val="4D5156"/>
+                </a:solidFill>
+                <a:effectLst/>
+                <a:latin typeface="Blackadder ITC" panose="04020505051007020D02" pitchFamily="82" charset="0"/>
+              </a:rPr>
+              <a:t>, </a:t>
+            </a:r>
+            <a:r>
+              <a:rPr lang="en-US" sz="4800" b="1" i="0" dirty="0">
+                <a:solidFill>
+                  <a:srgbClr val="5F6368"/>
+                </a:solidFill>
+                <a:effectLst/>
+                <a:latin typeface="Blackadder ITC" panose="04020505051007020D02" pitchFamily="82" charset="0"/>
+              </a:rPr>
+              <a:t>there</a:t>
+            </a:r>
+            <a:r>
+              <a:rPr lang="en-US" sz="4800" b="0" i="0" dirty="0">
+                <a:solidFill>
+                  <a:srgbClr val="4D5156"/>
+                </a:solidFill>
+                <a:effectLst/>
+                <a:latin typeface="Blackadder ITC" panose="04020505051007020D02" pitchFamily="82" charset="0"/>
+              </a:rPr>
+              <a:t> is always a </a:t>
+            </a:r>
+            <a:r>
+              <a:rPr lang="en-US" sz="4800" b="1" i="0" dirty="0">
+                <a:solidFill>
+                  <a:srgbClr val="5F6368"/>
+                </a:solidFill>
+                <a:effectLst/>
+                <a:latin typeface="Blackadder ITC" panose="04020505051007020D02" pitchFamily="82" charset="0"/>
+              </a:rPr>
+              <a:t>way</a:t>
+            </a:r>
+            <a:endParaRPr lang="en-GB" sz="4800" dirty="0">
+              <a:latin typeface="Blackadder ITC" panose="04020505051007020D02" pitchFamily="82" charset="0"/>
+            </a:endParaRPr>
+          </a:p>
+        </p:txBody>
+      </p:sp>
+      <p:sp>
+        <p:nvSpPr>
+          <p:cNvPr id="3" name="Text Placeholder 2">
+            <a:extLst>
+              <a:ext uri="{FF2B5EF4-FFF2-40B4-BE49-F238E27FC236}">
+                <a16:creationId xmlns:a16="http://schemas.microsoft.com/office/drawing/2014/main" id="{0FEC88D3-94B5-25B1-93ED-C6A2531CB077}"/>
+              </a:ext>
+            </a:extLst>
+          </p:cNvPr>
+          <p:cNvSpPr>
+            <a:spLocks noGrp="1"/>
+          </p:cNvSpPr>
+          <p:nvPr>
+            <p:ph type="body" idx="1"/>
+          </p:nvPr>
+        </p:nvSpPr>
+        <p:spPr>
+          <a:xfrm>
+            <a:off x="831850" y="3791825"/>
+            <a:ext cx="10515600" cy="2297826"/>
+          </a:xfrm>
+        </p:spPr>
+        <p:txBody>
+          <a:bodyPr>
+            <a:normAutofit/>
+          </a:bodyPr>
+          <a:lstStyle/>
+          <a:p>
+            <a:r>
+              <a:rPr lang="ru-RU" sz="4000" b="1" dirty="0"/>
+              <a:t>Буквально немає нічого неможливого. Коли є бажання, завжди є спосіб</a:t>
+            </a:r>
+            <a:endParaRPr lang="en-GB" sz="4000" b="1" dirty="0"/>
+          </a:p>
+        </p:txBody>
+      </p:sp>
+    </p:spTree>
+    <p:extLst>
+      <p:ext uri="{BB962C8B-B14F-4D97-AF65-F5344CB8AC3E}">
+        <p14:creationId xmlns:p14="http://schemas.microsoft.com/office/powerpoint/2010/main" val="2991976468"/>
+      </p:ext>
+    </p:extLst>
+  </p:cSld>
+  <p:clrMapOvr>
+    <a:masterClrMapping/>
+  </p:clrMapOvr>
+</p:sld>
+</file>
+
+<file path=ppt/slides/slide3.xml><?xml version="1.0" encoding="utf-8"?>
 <p:sld xmlns:a="http://schemas.openxmlformats.org/drawingml/2006/main" xmlns:r="http://schemas.openxmlformats.org/officeDocument/2006/relationships" xmlns:p="http://schemas.openxmlformats.org/presentationml/2006/main">
   <p:cSld>
     <p:spTree>
@@ -10864,7 +11241,7 @@
 </p:sld>
 </file>
 
-<file path=ppt/slides/slide3.xml><?xml version="1.0" encoding="utf-8"?>
+<file path=ppt/slides/slide4.xml><?xml version="1.0" encoding="utf-8"?>
 <p:sld xmlns:a="http://schemas.openxmlformats.org/drawingml/2006/main" xmlns:r="http://schemas.openxmlformats.org/officeDocument/2006/relationships" xmlns:p="http://schemas.openxmlformats.org/presentationml/2006/main">
   <p:cSld>
     <p:spTree>
@@ -11198,7 +11575,7 @@
 </p:sld>
 </file>
 
-<file path=ppt/slides/slide4.xml><?xml version="1.0" encoding="utf-8"?>
+<file path=ppt/slides/slide5.xml><?xml version="1.0" encoding="utf-8"?>
 <p:sld xmlns:a="http://schemas.openxmlformats.org/drawingml/2006/main" xmlns:r="http://schemas.openxmlformats.org/officeDocument/2006/relationships" xmlns:p="http://schemas.openxmlformats.org/presentationml/2006/main">
   <p:cSld>
     <p:spTree>
@@ -11370,7 +11747,7 @@
 </p:sld>
 </file>
 
-<file path=ppt/slides/slide5.xml><?xml version="1.0" encoding="utf-8"?>
+<file path=ppt/slides/slide6.xml><?xml version="1.0" encoding="utf-8"?>
 <p:sld xmlns:a="http://schemas.openxmlformats.org/drawingml/2006/main" xmlns:r="http://schemas.openxmlformats.org/officeDocument/2006/relationships" xmlns:p="http://schemas.openxmlformats.org/presentationml/2006/main">
   <p:cSld>
     <p:spTree>
@@ -11601,7 +11978,7 @@
 </p:sld>
 </file>
 
-<file path=ppt/slides/slide6.xml><?xml version="1.0" encoding="utf-8"?>
+<file path=ppt/slides/slide7.xml><?xml version="1.0" encoding="utf-8"?>
 <p:sld xmlns:a="http://schemas.openxmlformats.org/drawingml/2006/main" xmlns:r="http://schemas.openxmlformats.org/officeDocument/2006/relationships" xmlns:p="http://schemas.openxmlformats.org/presentationml/2006/main">
   <p:cSld>
     <p:spTree>
@@ -11804,7 +12181,7 @@
 </p:sld>
 </file>
 
-<file path=ppt/slides/slide7.xml><?xml version="1.0" encoding="utf-8"?>
+<file path=ppt/slides/slide8.xml><?xml version="1.0" encoding="utf-8"?>
 <p:sld xmlns:a="http://schemas.openxmlformats.org/drawingml/2006/main" xmlns:r="http://schemas.openxmlformats.org/officeDocument/2006/relationships" xmlns:p="http://schemas.openxmlformats.org/presentationml/2006/main">
   <p:cSld>
     <p:spTree>
@@ -12241,7 +12618,7 @@
 </p:sld>
 </file>
 
-<file path=ppt/slides/slide8.xml><?xml version="1.0" encoding="utf-8"?>
+<file path=ppt/slides/slide9.xml><?xml version="1.0" encoding="utf-8"?>
 <p:sld xmlns:a="http://schemas.openxmlformats.org/drawingml/2006/main" xmlns:r="http://schemas.openxmlformats.org/officeDocument/2006/relationships" xmlns:p="http://schemas.openxmlformats.org/presentationml/2006/main">
   <p:cSld>
     <p:spTree>
@@ -12436,183 +12813,6 @@
     <p:extLst>
       <p:ext uri="{BB962C8B-B14F-4D97-AF65-F5344CB8AC3E}">
         <p14:creationId xmlns:p14="http://schemas.microsoft.com/office/powerpoint/2010/main" val="2933418098"/>
-      </p:ext>
-    </p:extLst>
-  </p:cSld>
-  <p:clrMapOvr>
-    <a:masterClrMapping/>
-  </p:clrMapOvr>
-</p:sld>
-</file>
-
-<file path=ppt/slides/slide9.xml><?xml version="1.0" encoding="utf-8"?>
-<p:sld xmlns:a="http://schemas.openxmlformats.org/drawingml/2006/main" xmlns:r="http://schemas.openxmlformats.org/officeDocument/2006/relationships" xmlns:p="http://schemas.openxmlformats.org/presentationml/2006/main">
-  <p:cSld>
-    <p:spTree>
-      <p:nvGrpSpPr>
-        <p:cNvPr id="1" name=""/>
-        <p:cNvGrpSpPr/>
-        <p:nvPr/>
-      </p:nvGrpSpPr>
-      <p:grpSpPr>
-        <a:xfrm>
-          <a:off x="0" y="0"/>
-          <a:ext cx="0" cy="0"/>
-          <a:chOff x="0" y="0"/>
-          <a:chExt cx="0" cy="0"/>
-        </a:xfrm>
-      </p:grpSpPr>
-      <p:sp>
-        <p:nvSpPr>
-          <p:cNvPr id="2" name="Title 1">
-            <a:extLst>
-              <a:ext uri="{FF2B5EF4-FFF2-40B4-BE49-F238E27FC236}">
-                <a16:creationId xmlns:a16="http://schemas.microsoft.com/office/drawing/2014/main" id="{C1B588DC-9FE2-1808-7B45-01B05B2A7407}"/>
-              </a:ext>
-            </a:extLst>
-          </p:cNvPr>
-          <p:cNvSpPr>
-            <a:spLocks noGrp="1"/>
-          </p:cNvSpPr>
-          <p:nvPr>
-            <p:ph type="title"/>
-          </p:nvPr>
-        </p:nvSpPr>
-        <p:spPr/>
-        <p:txBody>
-          <a:bodyPr/>
-          <a:lstStyle/>
-          <a:p>
-            <a:r>
-              <a:rPr lang="en-US" dirty="0"/>
-              <a:t>String Data Type</a:t>
-            </a:r>
-            <a:endParaRPr lang="en-GB" dirty="0"/>
-          </a:p>
-        </p:txBody>
-      </p:sp>
-      <p:sp>
-        <p:nvSpPr>
-          <p:cNvPr id="3" name="Content Placeholder 2">
-            <a:extLst>
-              <a:ext uri="{FF2B5EF4-FFF2-40B4-BE49-F238E27FC236}">
-                <a16:creationId xmlns:a16="http://schemas.microsoft.com/office/drawing/2014/main" id="{A2FAB47A-24B8-F766-2880-341DFA7EC372}"/>
-              </a:ext>
-            </a:extLst>
-          </p:cNvPr>
-          <p:cNvSpPr>
-            <a:spLocks noGrp="1"/>
-          </p:cNvSpPr>
-          <p:nvPr>
-            <p:ph idx="1"/>
-          </p:nvPr>
-        </p:nvSpPr>
-        <p:spPr/>
-        <p:txBody>
-          <a:bodyPr/>
-          <a:lstStyle/>
-          <a:p>
-            <a:r>
-              <a:rPr lang="en-US" b="0" i="0" dirty="0">
-                <a:solidFill>
-                  <a:srgbClr val="4D5B7C"/>
-                </a:solidFill>
-                <a:effectLst/>
-                <a:latin typeface="Inter"/>
-              </a:rPr>
-              <a:t>The string is a sequence of characters. Python supports Unicode characters. Generally, strings are represented by either single or double-quotes.</a:t>
-            </a:r>
-          </a:p>
-          <a:p>
-            <a:endParaRPr lang="en-GB" dirty="0">
-              <a:solidFill>
-                <a:srgbClr val="4D5B7C"/>
-              </a:solidFill>
-              <a:latin typeface="Inter"/>
-            </a:endParaRPr>
-          </a:p>
-          <a:p>
-            <a:pPr marL="0" indent="0">
-              <a:buNone/>
-            </a:pPr>
-            <a:r>
-              <a:rPr lang="en-GB" sz="2000" b="0" i="0" dirty="0">
-                <a:effectLst/>
-              </a:rPr>
-              <a:t>name = "John Doe"   # this is a string example</a:t>
-            </a:r>
-          </a:p>
-          <a:p>
-            <a:pPr marL="0" indent="0">
-              <a:buNone/>
-            </a:pPr>
-            <a:r>
-              <a:rPr lang="en-GB" sz="2000" b="0" i="0" dirty="0">
-                <a:effectLst/>
-              </a:rPr>
-              <a:t>print(name)</a:t>
-            </a:r>
-          </a:p>
-          <a:p>
-            <a:pPr marL="0" indent="0">
-              <a:buNone/>
-            </a:pPr>
-            <a:endParaRPr lang="en-GB" sz="2000" b="0" i="0" dirty="0">
-              <a:effectLst/>
-            </a:endParaRPr>
-          </a:p>
-          <a:p>
-            <a:pPr marL="0" indent="0">
-              <a:buNone/>
-            </a:pPr>
-            <a:r>
-              <a:rPr lang="en-US" sz="2000" b="0" i="0" dirty="0">
-                <a:effectLst/>
-              </a:rPr>
-              <a:t>name = "John "   # String</a:t>
-            </a:r>
-          </a:p>
-          <a:p>
-            <a:pPr marL="0" indent="0">
-              <a:buNone/>
-            </a:pPr>
-            <a:r>
-              <a:rPr lang="en-US" sz="2000" b="0" i="0" dirty="0">
-                <a:effectLst/>
-              </a:rPr>
-              <a:t>age = 30              # Int </a:t>
-            </a:r>
-          </a:p>
-          <a:p>
-            <a:pPr marL="0" indent="0">
-              <a:buNone/>
-            </a:pPr>
-            <a:r>
-              <a:rPr lang="en-US" sz="2000" b="0" i="0" dirty="0">
-                <a:effectLst/>
-              </a:rPr>
-              <a:t>print(</a:t>
-            </a:r>
-            <a:r>
-              <a:rPr lang="en-US" sz="2000" b="0" i="0" dirty="0" err="1">
-                <a:effectLst/>
-              </a:rPr>
-              <a:t>f"Hello</a:t>
-            </a:r>
-            <a:r>
-              <a:rPr lang="en-US" sz="2000" b="0" i="0" dirty="0">
-                <a:effectLst/>
-              </a:rPr>
-              <a:t>, my name is {name} and I am {age} years old.")</a:t>
-            </a:r>
-            <a:endParaRPr lang="en-US" sz="2000" dirty="0"/>
-          </a:p>
-        </p:txBody>
-      </p:sp>
-    </p:spTree>
-    <p:extLst>
-      <p:ext uri="{BB962C8B-B14F-4D97-AF65-F5344CB8AC3E}">
-        <p14:creationId xmlns:p14="http://schemas.microsoft.com/office/powerpoint/2010/main" val="2572871167"/>
       </p:ext>
     </p:extLst>
   </p:cSld>

</xml_diff>

<commit_message>
changes after first session
</commit_message>
<xml_diff>
--- a/Python_Training_XXXXXX_V1.pptx
+++ b/Python_Training_XXXXXX_V1.pptx
@@ -131,6 +131,45 @@
 
 <file path=ppt/changesInfos/changesInfo1.xml><?xml version="1.0" encoding="utf-8"?>
 <pc:chgInfo xmlns:a="http://schemas.openxmlformats.org/drawingml/2006/main" xmlns:r="http://schemas.openxmlformats.org/officeDocument/2006/relationships" xmlns:ac="http://schemas.microsoft.com/office/drawing/2013/main/command" xmlns:pc="http://schemas.microsoft.com/office/powerpoint/2013/main/command">
+  <pc:docChgLst>
+    <pc:chgData name="Marco" userId="d7bcd177-0ddd-42e9-8665-046e17e9d9ac" providerId="ADAL" clId="{072CD353-33CC-4253-AE63-82F7FD1B1DC8}"/>
+    <pc:docChg chg="modSld">
+      <pc:chgData name="Marco" userId="d7bcd177-0ddd-42e9-8665-046e17e9d9ac" providerId="ADAL" clId="{072CD353-33CC-4253-AE63-82F7FD1B1DC8}" dt="2024-02-15T14:13:57.739" v="4" actId="20577"/>
+      <pc:docMkLst>
+        <pc:docMk/>
+      </pc:docMkLst>
+      <pc:sldChg chg="modSp mod">
+        <pc:chgData name="Marco" userId="d7bcd177-0ddd-42e9-8665-046e17e9d9ac" providerId="ADAL" clId="{072CD353-33CC-4253-AE63-82F7FD1B1DC8}" dt="2024-02-15T14:13:57.739" v="4" actId="20577"/>
+        <pc:sldMkLst>
+          <pc:docMk/>
+          <pc:sldMk cId="1950530670" sldId="263"/>
+        </pc:sldMkLst>
+        <pc:spChg chg="mod">
+          <ac:chgData name="Marco" userId="d7bcd177-0ddd-42e9-8665-046e17e9d9ac" providerId="ADAL" clId="{072CD353-33CC-4253-AE63-82F7FD1B1DC8}" dt="2024-02-15T14:13:57.739" v="4" actId="20577"/>
+          <ac:spMkLst>
+            <pc:docMk/>
+            <pc:sldMk cId="1950530670" sldId="263"/>
+            <ac:spMk id="3" creationId="{9EA57DF8-82B4-3F7F-30E2-0908193D11B9}"/>
+          </ac:spMkLst>
+        </pc:spChg>
+      </pc:sldChg>
+      <pc:sldChg chg="modSp mod">
+        <pc:chgData name="Marco" userId="d7bcd177-0ddd-42e9-8665-046e17e9d9ac" providerId="ADAL" clId="{072CD353-33CC-4253-AE63-82F7FD1B1DC8}" dt="2024-02-15T14:04:18.016" v="3" actId="20577"/>
+        <pc:sldMkLst>
+          <pc:docMk/>
+          <pc:sldMk cId="1608759840" sldId="264"/>
+        </pc:sldMkLst>
+        <pc:spChg chg="mod">
+          <ac:chgData name="Marco" userId="d7bcd177-0ddd-42e9-8665-046e17e9d9ac" providerId="ADAL" clId="{072CD353-33CC-4253-AE63-82F7FD1B1DC8}" dt="2024-02-15T14:04:18.016" v="3" actId="20577"/>
+          <ac:spMkLst>
+            <pc:docMk/>
+            <pc:sldMk cId="1608759840" sldId="264"/>
+            <ac:spMk id="3" creationId="{25E93778-EF58-B193-75C7-BE37D5F2BB00}"/>
+          </ac:spMkLst>
+        </pc:spChg>
+      </pc:sldChg>
+    </pc:docChg>
+  </pc:docChgLst>
   <pc:docChgLst>
     <pc:chgData name="Moro, Marco" userId="d7bcd177-0ddd-42e9-8665-046e17e9d9ac" providerId="ADAL" clId="{072CD353-33CC-4253-AE63-82F7FD1B1DC8}"/>
     <pc:docChg chg="undo custSel addSld delSld modSld">
@@ -376,7 +415,7 @@
           <a:p>
             <a:fld id="{3D8FED83-86F4-482A-91F0-A1EF509DC55C}" type="datetimeFigureOut">
               <a:rPr lang="en-GB" smtClean="0"/>
-              <a:t>14/02/2024</a:t>
+              <a:t>15/02/2024</a:t>
             </a:fld>
             <a:endParaRPr lang="en-GB"/>
           </a:p>
@@ -576,7 +615,7 @@
           <a:p>
             <a:fld id="{3D8FED83-86F4-482A-91F0-A1EF509DC55C}" type="datetimeFigureOut">
               <a:rPr lang="en-GB" smtClean="0"/>
-              <a:t>14/02/2024</a:t>
+              <a:t>15/02/2024</a:t>
             </a:fld>
             <a:endParaRPr lang="en-GB"/>
           </a:p>
@@ -786,7 +825,7 @@
           <a:p>
             <a:fld id="{3D8FED83-86F4-482A-91F0-A1EF509DC55C}" type="datetimeFigureOut">
               <a:rPr lang="en-GB" smtClean="0"/>
-              <a:t>14/02/2024</a:t>
+              <a:t>15/02/2024</a:t>
             </a:fld>
             <a:endParaRPr lang="en-GB"/>
           </a:p>
@@ -986,7 +1025,7 @@
           <a:p>
             <a:fld id="{3D8FED83-86F4-482A-91F0-A1EF509DC55C}" type="datetimeFigureOut">
               <a:rPr lang="en-GB" smtClean="0"/>
-              <a:t>14/02/2024</a:t>
+              <a:t>15/02/2024</a:t>
             </a:fld>
             <a:endParaRPr lang="en-GB"/>
           </a:p>
@@ -1262,7 +1301,7 @@
           <a:p>
             <a:fld id="{3D8FED83-86F4-482A-91F0-A1EF509DC55C}" type="datetimeFigureOut">
               <a:rPr lang="en-GB" smtClean="0"/>
-              <a:t>14/02/2024</a:t>
+              <a:t>15/02/2024</a:t>
             </a:fld>
             <a:endParaRPr lang="en-GB"/>
           </a:p>
@@ -1530,7 +1569,7 @@
           <a:p>
             <a:fld id="{3D8FED83-86F4-482A-91F0-A1EF509DC55C}" type="datetimeFigureOut">
               <a:rPr lang="en-GB" smtClean="0"/>
-              <a:t>14/02/2024</a:t>
+              <a:t>15/02/2024</a:t>
             </a:fld>
             <a:endParaRPr lang="en-GB"/>
           </a:p>
@@ -1945,7 +1984,7 @@
           <a:p>
             <a:fld id="{3D8FED83-86F4-482A-91F0-A1EF509DC55C}" type="datetimeFigureOut">
               <a:rPr lang="en-GB" smtClean="0"/>
-              <a:t>14/02/2024</a:t>
+              <a:t>15/02/2024</a:t>
             </a:fld>
             <a:endParaRPr lang="en-GB"/>
           </a:p>
@@ -2087,7 +2126,7 @@
           <a:p>
             <a:fld id="{3D8FED83-86F4-482A-91F0-A1EF509DC55C}" type="datetimeFigureOut">
               <a:rPr lang="en-GB" smtClean="0"/>
-              <a:t>14/02/2024</a:t>
+              <a:t>15/02/2024</a:t>
             </a:fld>
             <a:endParaRPr lang="en-GB"/>
           </a:p>
@@ -2200,7 +2239,7 @@
           <a:p>
             <a:fld id="{3D8FED83-86F4-482A-91F0-A1EF509DC55C}" type="datetimeFigureOut">
               <a:rPr lang="en-GB" smtClean="0"/>
-              <a:t>14/02/2024</a:t>
+              <a:t>15/02/2024</a:t>
             </a:fld>
             <a:endParaRPr lang="en-GB"/>
           </a:p>
@@ -2513,7 +2552,7 @@
           <a:p>
             <a:fld id="{3D8FED83-86F4-482A-91F0-A1EF509DC55C}" type="datetimeFigureOut">
               <a:rPr lang="en-GB" smtClean="0"/>
-              <a:t>14/02/2024</a:t>
+              <a:t>15/02/2024</a:t>
             </a:fld>
             <a:endParaRPr lang="en-GB"/>
           </a:p>
@@ -2802,7 +2841,7 @@
           <a:p>
             <a:fld id="{3D8FED83-86F4-482A-91F0-A1EF509DC55C}" type="datetimeFigureOut">
               <a:rPr lang="en-GB" smtClean="0"/>
-              <a:t>14/02/2024</a:t>
+              <a:t>15/02/2024</a:t>
             </a:fld>
             <a:endParaRPr lang="en-GB"/>
           </a:p>
@@ -3045,7 +3084,7 @@
           <a:p>
             <a:fld id="{3D8FED83-86F4-482A-91F0-A1EF509DC55C}" type="datetimeFigureOut">
               <a:rPr lang="en-GB" smtClean="0"/>
-              <a:t>14/02/2024</a:t>
+              <a:t>15/02/2024</a:t>
             </a:fld>
             <a:endParaRPr lang="en-GB"/>
           </a:p>
@@ -11711,7 +11750,7 @@
             </a:pPr>
             <a:r>
               <a:rPr lang="en-US" dirty="0"/>
-              <a:t>   git pull origin main ( try sync your local to remote)</a:t>
+              <a:t>   git push origin main ( try sync your local to remote)</a:t>
             </a:r>
           </a:p>
           <a:p>
@@ -12076,13 +12115,8 @@
           <a:p>
             <a:r>
               <a:rPr lang="en-GB" sz="2000" dirty="0"/>
-              <a:t>// This program prints Hello, world! in </a:t>
-            </a:r>
-            <a:r>
-              <a:rPr lang="en-GB" sz="2000" dirty="0" err="1"/>
-              <a:t>Janva</a:t>
-            </a:r>
-            <a:endParaRPr lang="en-GB" sz="2000" dirty="0"/>
+              <a:t>// This program prints Hello, world! in Java</a:t>
+            </a:r>
           </a:p>
           <a:p>
             <a:pPr marL="0" indent="0">

</xml_diff>

<commit_message>
Files for Lesson 3
</commit_message>
<xml_diff>
--- a/Python_Training_XXXXXX_V1.pptx
+++ b/Python_Training_XXXXXX_V1.pptx
@@ -15,6 +15,9 @@
     <p:sldId id="260" r:id="rId9"/>
     <p:sldId id="261" r:id="rId10"/>
     <p:sldId id="262" r:id="rId11"/>
+    <p:sldId id="266" r:id="rId12"/>
+    <p:sldId id="267" r:id="rId13"/>
+    <p:sldId id="268" r:id="rId14"/>
   </p:sldIdLst>
   <p:sldSz cx="12192000" cy="6858000"/>
   <p:notesSz cx="6858000" cy="9144000"/>
@@ -124,7 +127,7 @@
 <file path=ppt/revisionInfo.xml><?xml version="1.0" encoding="utf-8"?>
 <p1510:revInfo xmlns:a="http://schemas.openxmlformats.org/drawingml/2006/main" xmlns:r="http://schemas.openxmlformats.org/officeDocument/2006/relationships" xmlns:p1510="http://schemas.microsoft.com/office/powerpoint/2015/10/main">
   <p1510:revLst>
-    <p1510:client id="{072CD353-33CC-4253-AE63-82F7FD1B1DC8}" v="3" dt="2024-02-15T12:49:13.819"/>
+    <p1510:client id="{072CD353-33CC-4253-AE63-82F7FD1B1DC8}" v="28" dt="2024-02-23T14:30:54.461"/>
   </p1510:revLst>
 </p1510:revInfo>
 </file>
@@ -173,7 +176,7 @@
   <pc:docChgLst>
     <pc:chgData name="Moro, Marco" userId="d7bcd177-0ddd-42e9-8665-046e17e9d9ac" providerId="ADAL" clId="{072CD353-33CC-4253-AE63-82F7FD1B1DC8}"/>
     <pc:docChg chg="undo custSel addSld delSld modSld">
-      <pc:chgData name="Moro, Marco" userId="d7bcd177-0ddd-42e9-8665-046e17e9d9ac" providerId="ADAL" clId="{072CD353-33CC-4253-AE63-82F7FD1B1DC8}" dt="2024-02-15T12:49:28.775" v="338" actId="255"/>
+      <pc:chgData name="Moro, Marco" userId="d7bcd177-0ddd-42e9-8665-046e17e9d9ac" providerId="ADAL" clId="{072CD353-33CC-4253-AE63-82F7FD1B1DC8}" dt="2024-02-23T14:34:17.291" v="624" actId="20577"/>
       <pc:docMkLst>
         <pc:docMk/>
       </pc:docMkLst>
@@ -261,6 +264,167 @@
           </ac:spMkLst>
         </pc:spChg>
       </pc:sldChg>
+      <pc:sldChg chg="addSp delSp modSp new del">
+        <pc:chgData name="Moro, Marco" userId="d7bcd177-0ddd-42e9-8665-046e17e9d9ac" providerId="ADAL" clId="{072CD353-33CC-4253-AE63-82F7FD1B1DC8}" dt="2024-02-22T15:02:23.755" v="408" actId="2696"/>
+        <pc:sldMkLst>
+          <pc:docMk/>
+          <pc:sldMk cId="1262681558" sldId="266"/>
+        </pc:sldMkLst>
+        <pc:picChg chg="add del mod">
+          <ac:chgData name="Moro, Marco" userId="d7bcd177-0ddd-42e9-8665-046e17e9d9ac" providerId="ADAL" clId="{072CD353-33CC-4253-AE63-82F7FD1B1DC8}" dt="2024-02-22T15:02:18.590" v="407"/>
+          <ac:picMkLst>
+            <pc:docMk/>
+            <pc:sldMk cId="1262681558" sldId="266"/>
+            <ac:picMk id="2050" creationId="{BB257DA9-8D2C-8888-AFDC-FCD06813081C}"/>
+          </ac:picMkLst>
+        </pc:picChg>
+      </pc:sldChg>
+      <pc:sldChg chg="addSp modSp new add del mod">
+        <pc:chgData name="Moro, Marco" userId="d7bcd177-0ddd-42e9-8665-046e17e9d9ac" providerId="ADAL" clId="{072CD353-33CC-4253-AE63-82F7FD1B1DC8}" dt="2024-02-22T15:00:11.386" v="393" actId="2696"/>
+        <pc:sldMkLst>
+          <pc:docMk/>
+          <pc:sldMk cId="2530789891" sldId="266"/>
+        </pc:sldMkLst>
+        <pc:spChg chg="mod">
+          <ac:chgData name="Moro, Marco" userId="d7bcd177-0ddd-42e9-8665-046e17e9d9ac" providerId="ADAL" clId="{072CD353-33CC-4253-AE63-82F7FD1B1DC8}" dt="2024-02-22T14:58:34.047" v="379" actId="20577"/>
+          <ac:spMkLst>
+            <pc:docMk/>
+            <pc:sldMk cId="2530789891" sldId="266"/>
+            <ac:spMk id="2" creationId="{3E40F176-D8D4-DA1F-BD66-154A58B8B286}"/>
+          </ac:spMkLst>
+        </pc:spChg>
+        <pc:spChg chg="mod">
+          <ac:chgData name="Moro, Marco" userId="d7bcd177-0ddd-42e9-8665-046e17e9d9ac" providerId="ADAL" clId="{072CD353-33CC-4253-AE63-82F7FD1B1DC8}" dt="2024-02-22T14:59:11.028" v="390" actId="1076"/>
+          <ac:spMkLst>
+            <pc:docMk/>
+            <pc:sldMk cId="2530789891" sldId="266"/>
+            <ac:spMk id="3" creationId="{78E2DB87-4B3E-BEE2-12C3-C859C0C0BABE}"/>
+          </ac:spMkLst>
+        </pc:spChg>
+        <pc:spChg chg="add mod">
+          <ac:chgData name="Moro, Marco" userId="d7bcd177-0ddd-42e9-8665-046e17e9d9ac" providerId="ADAL" clId="{072CD353-33CC-4253-AE63-82F7FD1B1DC8}" dt="2024-02-22T14:58:45.599" v="383" actId="20577"/>
+          <ac:spMkLst>
+            <pc:docMk/>
+            <pc:sldMk cId="2530789891" sldId="266"/>
+            <ac:spMk id="4" creationId="{9556B3C5-F37F-47DA-0696-263D86EF7958}"/>
+          </ac:spMkLst>
+        </pc:spChg>
+        <pc:picChg chg="add mod">
+          <ac:chgData name="Moro, Marco" userId="d7bcd177-0ddd-42e9-8665-046e17e9d9ac" providerId="ADAL" clId="{072CD353-33CC-4253-AE63-82F7FD1B1DC8}" dt="2024-02-22T14:58:12.094" v="344" actId="14100"/>
+          <ac:picMkLst>
+            <pc:docMk/>
+            <pc:sldMk cId="2530789891" sldId="266"/>
+            <ac:picMk id="1026" creationId="{C5978616-7854-B9BD-2A66-7C946727475A}"/>
+          </ac:picMkLst>
+        </pc:picChg>
+      </pc:sldChg>
+      <pc:sldChg chg="addSp delSp modSp new mod">
+        <pc:chgData name="Moro, Marco" userId="d7bcd177-0ddd-42e9-8665-046e17e9d9ac" providerId="ADAL" clId="{072CD353-33CC-4253-AE63-82F7FD1B1DC8}" dt="2024-02-22T15:02:48.370" v="442" actId="20577"/>
+        <pc:sldMkLst>
+          <pc:docMk/>
+          <pc:sldMk cId="4011891587" sldId="266"/>
+        </pc:sldMkLst>
+        <pc:spChg chg="mod">
+          <ac:chgData name="Moro, Marco" userId="d7bcd177-0ddd-42e9-8665-046e17e9d9ac" providerId="ADAL" clId="{072CD353-33CC-4253-AE63-82F7FD1B1DC8}" dt="2024-02-22T15:02:48.370" v="442" actId="20577"/>
+          <ac:spMkLst>
+            <pc:docMk/>
+            <pc:sldMk cId="4011891587" sldId="266"/>
+            <ac:spMk id="2" creationId="{90FE8077-47E8-90CA-47A9-74568D93CEC2}"/>
+          </ac:spMkLst>
+        </pc:spChg>
+        <pc:spChg chg="del">
+          <ac:chgData name="Moro, Marco" userId="d7bcd177-0ddd-42e9-8665-046e17e9d9ac" providerId="ADAL" clId="{072CD353-33CC-4253-AE63-82F7FD1B1DC8}" dt="2024-02-22T15:02:33.677" v="410"/>
+          <ac:spMkLst>
+            <pc:docMk/>
+            <pc:sldMk cId="4011891587" sldId="266"/>
+            <ac:spMk id="3" creationId="{39E46142-63C7-9789-E45C-189B0D6CE509}"/>
+          </ac:spMkLst>
+        </pc:spChg>
+        <pc:picChg chg="add mod">
+          <ac:chgData name="Moro, Marco" userId="d7bcd177-0ddd-42e9-8665-046e17e9d9ac" providerId="ADAL" clId="{072CD353-33CC-4253-AE63-82F7FD1B1DC8}" dt="2024-02-22T15:02:37.253" v="412" actId="14100"/>
+          <ac:picMkLst>
+            <pc:docMk/>
+            <pc:sldMk cId="4011891587" sldId="266"/>
+            <ac:picMk id="4098" creationId="{D74642C5-D941-13DA-0760-E0466A2F2654}"/>
+          </ac:picMkLst>
+        </pc:picChg>
+      </pc:sldChg>
+      <pc:sldChg chg="add del">
+        <pc:chgData name="Moro, Marco" userId="d7bcd177-0ddd-42e9-8665-046e17e9d9ac" providerId="ADAL" clId="{072CD353-33CC-4253-AE63-82F7FD1B1DC8}" dt="2024-02-22T15:00:47.623" v="396"/>
+        <pc:sldMkLst>
+          <pc:docMk/>
+          <pc:sldMk cId="252467940" sldId="267"/>
+        </pc:sldMkLst>
+      </pc:sldChg>
+      <pc:sldChg chg="addSp delSp modSp new mod">
+        <pc:chgData name="Moro, Marco" userId="d7bcd177-0ddd-42e9-8665-046e17e9d9ac" providerId="ADAL" clId="{072CD353-33CC-4253-AE63-82F7FD1B1DC8}" dt="2024-02-23T09:50:39.172" v="482" actId="20577"/>
+        <pc:sldMkLst>
+          <pc:docMk/>
+          <pc:sldMk cId="692835320" sldId="267"/>
+        </pc:sldMkLst>
+        <pc:spChg chg="mod">
+          <ac:chgData name="Moro, Marco" userId="d7bcd177-0ddd-42e9-8665-046e17e9d9ac" providerId="ADAL" clId="{072CD353-33CC-4253-AE63-82F7FD1B1DC8}" dt="2024-02-23T09:49:06.353" v="466" actId="20577"/>
+          <ac:spMkLst>
+            <pc:docMk/>
+            <pc:sldMk cId="692835320" sldId="267"/>
+            <ac:spMk id="2" creationId="{0AF7CBA0-6AF4-BD4F-324F-2D6889883F56}"/>
+          </ac:spMkLst>
+        </pc:spChg>
+        <pc:spChg chg="mod">
+          <ac:chgData name="Moro, Marco" userId="d7bcd177-0ddd-42e9-8665-046e17e9d9ac" providerId="ADAL" clId="{072CD353-33CC-4253-AE63-82F7FD1B1DC8}" dt="2024-02-23T09:50:39.172" v="482" actId="20577"/>
+          <ac:spMkLst>
+            <pc:docMk/>
+            <pc:sldMk cId="692835320" sldId="267"/>
+            <ac:spMk id="3" creationId="{1B8975F3-0DD1-5FD5-27A8-995AE0C37A2C}"/>
+          </ac:spMkLst>
+        </pc:spChg>
+        <pc:spChg chg="add del">
+          <ac:chgData name="Moro, Marco" userId="d7bcd177-0ddd-42e9-8665-046e17e9d9ac" providerId="ADAL" clId="{072CD353-33CC-4253-AE63-82F7FD1B1DC8}" dt="2024-02-23T09:50:02.692" v="469"/>
+          <ac:spMkLst>
+            <pc:docMk/>
+            <pc:sldMk cId="692835320" sldId="267"/>
+            <ac:spMk id="4" creationId="{7571E925-BCEB-83B6-5E4C-80FC0BD4344A}"/>
+          </ac:spMkLst>
+        </pc:spChg>
+      </pc:sldChg>
+      <pc:sldChg chg="modSp add del mod">
+        <pc:chgData name="Moro, Marco" userId="d7bcd177-0ddd-42e9-8665-046e17e9d9ac" providerId="ADAL" clId="{072CD353-33CC-4253-AE63-82F7FD1B1DC8}" dt="2024-02-22T15:01:45.293" v="401" actId="47"/>
+        <pc:sldMkLst>
+          <pc:docMk/>
+          <pc:sldMk cId="4230859014" sldId="267"/>
+        </pc:sldMkLst>
+        <pc:spChg chg="mod">
+          <ac:chgData name="Moro, Marco" userId="d7bcd177-0ddd-42e9-8665-046e17e9d9ac" providerId="ADAL" clId="{072CD353-33CC-4253-AE63-82F7FD1B1DC8}" dt="2024-02-22T15:01:20.271" v="400" actId="14100"/>
+          <ac:spMkLst>
+            <pc:docMk/>
+            <pc:sldMk cId="4230859014" sldId="267"/>
+            <ac:spMk id="3" creationId="{78E2DB87-4B3E-BEE2-12C3-C859C0C0BABE}"/>
+          </ac:spMkLst>
+        </pc:spChg>
+      </pc:sldChg>
+      <pc:sldChg chg="modSp new mod">
+        <pc:chgData name="Moro, Marco" userId="d7bcd177-0ddd-42e9-8665-046e17e9d9ac" providerId="ADAL" clId="{072CD353-33CC-4253-AE63-82F7FD1B1DC8}" dt="2024-02-23T14:34:17.291" v="624" actId="20577"/>
+        <pc:sldMkLst>
+          <pc:docMk/>
+          <pc:sldMk cId="2509201695" sldId="268"/>
+        </pc:sldMkLst>
+        <pc:spChg chg="mod">
+          <ac:chgData name="Moro, Marco" userId="d7bcd177-0ddd-42e9-8665-046e17e9d9ac" providerId="ADAL" clId="{072CD353-33CC-4253-AE63-82F7FD1B1DC8}" dt="2024-02-23T14:26:57.616" v="499" actId="20577"/>
+          <ac:spMkLst>
+            <pc:docMk/>
+            <pc:sldMk cId="2509201695" sldId="268"/>
+            <ac:spMk id="2" creationId="{5A6AFD41-B15B-6226-65EE-73897DCED782}"/>
+          </ac:spMkLst>
+        </pc:spChg>
+        <pc:spChg chg="mod">
+          <ac:chgData name="Moro, Marco" userId="d7bcd177-0ddd-42e9-8665-046e17e9d9ac" providerId="ADAL" clId="{072CD353-33CC-4253-AE63-82F7FD1B1DC8}" dt="2024-02-23T14:34:17.291" v="624" actId="20577"/>
+          <ac:spMkLst>
+            <pc:docMk/>
+            <pc:sldMk cId="2509201695" sldId="268"/>
+            <ac:spMk id="3" creationId="{52E68175-DDFA-2AFF-8E57-E5094AE10758}"/>
+          </ac:spMkLst>
+        </pc:spChg>
+      </pc:sldChg>
     </pc:docChg>
   </pc:docChgLst>
 </pc:chgInfo>
@@ -415,7 +579,7 @@
           <a:p>
             <a:fld id="{3D8FED83-86F4-482A-91F0-A1EF509DC55C}" type="datetimeFigureOut">
               <a:rPr lang="en-GB" smtClean="0"/>
-              <a:t>15/02/2024</a:t>
+              <a:t>22/02/2024</a:t>
             </a:fld>
             <a:endParaRPr lang="en-GB"/>
           </a:p>
@@ -615,7 +779,7 @@
           <a:p>
             <a:fld id="{3D8FED83-86F4-482A-91F0-A1EF509DC55C}" type="datetimeFigureOut">
               <a:rPr lang="en-GB" smtClean="0"/>
-              <a:t>15/02/2024</a:t>
+              <a:t>22/02/2024</a:t>
             </a:fld>
             <a:endParaRPr lang="en-GB"/>
           </a:p>
@@ -825,7 +989,7 @@
           <a:p>
             <a:fld id="{3D8FED83-86F4-482A-91F0-A1EF509DC55C}" type="datetimeFigureOut">
               <a:rPr lang="en-GB" smtClean="0"/>
-              <a:t>15/02/2024</a:t>
+              <a:t>22/02/2024</a:t>
             </a:fld>
             <a:endParaRPr lang="en-GB"/>
           </a:p>
@@ -1025,7 +1189,7 @@
           <a:p>
             <a:fld id="{3D8FED83-86F4-482A-91F0-A1EF509DC55C}" type="datetimeFigureOut">
               <a:rPr lang="en-GB" smtClean="0"/>
-              <a:t>15/02/2024</a:t>
+              <a:t>22/02/2024</a:t>
             </a:fld>
             <a:endParaRPr lang="en-GB"/>
           </a:p>
@@ -1301,7 +1465,7 @@
           <a:p>
             <a:fld id="{3D8FED83-86F4-482A-91F0-A1EF509DC55C}" type="datetimeFigureOut">
               <a:rPr lang="en-GB" smtClean="0"/>
-              <a:t>15/02/2024</a:t>
+              <a:t>22/02/2024</a:t>
             </a:fld>
             <a:endParaRPr lang="en-GB"/>
           </a:p>
@@ -1569,7 +1733,7 @@
           <a:p>
             <a:fld id="{3D8FED83-86F4-482A-91F0-A1EF509DC55C}" type="datetimeFigureOut">
               <a:rPr lang="en-GB" smtClean="0"/>
-              <a:t>15/02/2024</a:t>
+              <a:t>22/02/2024</a:t>
             </a:fld>
             <a:endParaRPr lang="en-GB"/>
           </a:p>
@@ -1984,7 +2148,7 @@
           <a:p>
             <a:fld id="{3D8FED83-86F4-482A-91F0-A1EF509DC55C}" type="datetimeFigureOut">
               <a:rPr lang="en-GB" smtClean="0"/>
-              <a:t>15/02/2024</a:t>
+              <a:t>22/02/2024</a:t>
             </a:fld>
             <a:endParaRPr lang="en-GB"/>
           </a:p>
@@ -2126,7 +2290,7 @@
           <a:p>
             <a:fld id="{3D8FED83-86F4-482A-91F0-A1EF509DC55C}" type="datetimeFigureOut">
               <a:rPr lang="en-GB" smtClean="0"/>
-              <a:t>15/02/2024</a:t>
+              <a:t>22/02/2024</a:t>
             </a:fld>
             <a:endParaRPr lang="en-GB"/>
           </a:p>
@@ -2239,7 +2403,7 @@
           <a:p>
             <a:fld id="{3D8FED83-86F4-482A-91F0-A1EF509DC55C}" type="datetimeFigureOut">
               <a:rPr lang="en-GB" smtClean="0"/>
-              <a:t>15/02/2024</a:t>
+              <a:t>22/02/2024</a:t>
             </a:fld>
             <a:endParaRPr lang="en-GB"/>
           </a:p>
@@ -2552,7 +2716,7 @@
           <a:p>
             <a:fld id="{3D8FED83-86F4-482A-91F0-A1EF509DC55C}" type="datetimeFigureOut">
               <a:rPr lang="en-GB" smtClean="0"/>
-              <a:t>15/02/2024</a:t>
+              <a:t>22/02/2024</a:t>
             </a:fld>
             <a:endParaRPr lang="en-GB"/>
           </a:p>
@@ -2841,7 +3005,7 @@
           <a:p>
             <a:fld id="{3D8FED83-86F4-482A-91F0-A1EF509DC55C}" type="datetimeFigureOut">
               <a:rPr lang="en-GB" smtClean="0"/>
-              <a:t>15/02/2024</a:t>
+              <a:t>22/02/2024</a:t>
             </a:fld>
             <a:endParaRPr lang="en-GB"/>
           </a:p>
@@ -3084,7 +3248,7 @@
           <a:p>
             <a:fld id="{3D8FED83-86F4-482A-91F0-A1EF509DC55C}" type="datetimeFigureOut">
               <a:rPr lang="en-GB" smtClean="0"/>
-              <a:t>15/02/2024</a:t>
+              <a:t>22/02/2024</a:t>
             </a:fld>
             <a:endParaRPr lang="en-GB"/>
           </a:p>
@@ -10970,6 +11134,535 @@
 </p:sld>
 </file>
 
+<file path=ppt/slides/slide11.xml><?xml version="1.0" encoding="utf-8"?>
+<p:sld xmlns:a="http://schemas.openxmlformats.org/drawingml/2006/main" xmlns:r="http://schemas.openxmlformats.org/officeDocument/2006/relationships" xmlns:p="http://schemas.openxmlformats.org/presentationml/2006/main">
+  <p:cSld>
+    <p:spTree>
+      <p:nvGrpSpPr>
+        <p:cNvPr id="1" name=""/>
+        <p:cNvGrpSpPr/>
+        <p:nvPr/>
+      </p:nvGrpSpPr>
+      <p:grpSpPr>
+        <a:xfrm>
+          <a:off x="0" y="0"/>
+          <a:ext cx="0" cy="0"/>
+          <a:chOff x="0" y="0"/>
+          <a:chExt cx="0" cy="0"/>
+        </a:xfrm>
+      </p:grpSpPr>
+      <p:sp>
+        <p:nvSpPr>
+          <p:cNvPr id="2" name="Title 1">
+            <a:extLst>
+              <a:ext uri="{FF2B5EF4-FFF2-40B4-BE49-F238E27FC236}">
+                <a16:creationId xmlns:a16="http://schemas.microsoft.com/office/drawing/2014/main" id="{90FE8077-47E8-90CA-47A9-74568D93CEC2}"/>
+              </a:ext>
+            </a:extLst>
+          </p:cNvPr>
+          <p:cNvSpPr>
+            <a:spLocks noGrp="1"/>
+          </p:cNvSpPr>
+          <p:nvPr>
+            <p:ph type="title"/>
+          </p:nvPr>
+        </p:nvSpPr>
+        <p:spPr/>
+        <p:txBody>
+          <a:bodyPr/>
+          <a:lstStyle/>
+          <a:p>
+            <a:r>
+              <a:rPr lang="en-US" dirty="0"/>
+              <a:t>Assignment Operator Table </a:t>
+            </a:r>
+            <a:endParaRPr lang="en-GB" dirty="0"/>
+          </a:p>
+        </p:txBody>
+      </p:sp>
+      <p:pic>
+        <p:nvPicPr>
+          <p:cNvPr id="4098" name="Picture 2">
+            <a:extLst>
+              <a:ext uri="{FF2B5EF4-FFF2-40B4-BE49-F238E27FC236}">
+                <a16:creationId xmlns:a16="http://schemas.microsoft.com/office/drawing/2014/main" id="{D74642C5-D941-13DA-0760-E0466A2F2654}"/>
+              </a:ext>
+            </a:extLst>
+          </p:cNvPr>
+          <p:cNvPicPr>
+            <a:picLocks noGrp="1" noChangeAspect="1" noChangeArrowheads="1"/>
+          </p:cNvPicPr>
+          <p:nvPr>
+            <p:ph idx="1"/>
+          </p:nvPr>
+        </p:nvPicPr>
+        <p:blipFill>
+          <a:blip r:embed="rId2">
+            <a:extLst>
+              <a:ext uri="{28A0092B-C50C-407E-A947-70E740481C1C}">
+                <a14:useLocalDpi xmlns:a14="http://schemas.microsoft.com/office/drawing/2010/main" val="0"/>
+              </a:ext>
+            </a:extLst>
+          </a:blip>
+          <a:srcRect/>
+          <a:stretch>
+            <a:fillRect/>
+          </a:stretch>
+        </p:blipFill>
+        <p:spPr bwMode="auto">
+          <a:xfrm>
+            <a:off x="1604865" y="1972469"/>
+            <a:ext cx="8714792" cy="4057650"/>
+          </a:xfrm>
+          <a:prstGeom prst="rect">
+            <a:avLst/>
+          </a:prstGeom>
+          <a:noFill/>
+          <a:extLst>
+            <a:ext uri="{909E8E84-426E-40DD-AFC4-6F175D3DCCD1}">
+              <a14:hiddenFill xmlns:a14="http://schemas.microsoft.com/office/drawing/2010/main">
+                <a:solidFill>
+                  <a:srgbClr val="FFFFFF"/>
+                </a:solidFill>
+              </a14:hiddenFill>
+            </a:ext>
+          </a:extLst>
+        </p:spPr>
+      </p:pic>
+    </p:spTree>
+    <p:extLst>
+      <p:ext uri="{BB962C8B-B14F-4D97-AF65-F5344CB8AC3E}">
+        <p14:creationId xmlns:p14="http://schemas.microsoft.com/office/powerpoint/2010/main" val="4011891587"/>
+      </p:ext>
+    </p:extLst>
+  </p:cSld>
+  <p:clrMapOvr>
+    <a:masterClrMapping/>
+  </p:clrMapOvr>
+</p:sld>
+</file>
+
+<file path=ppt/slides/slide12.xml><?xml version="1.0" encoding="utf-8"?>
+<p:sld xmlns:a="http://schemas.openxmlformats.org/drawingml/2006/main" xmlns:r="http://schemas.openxmlformats.org/officeDocument/2006/relationships" xmlns:p="http://schemas.openxmlformats.org/presentationml/2006/main">
+  <p:cSld>
+    <p:spTree>
+      <p:nvGrpSpPr>
+        <p:cNvPr id="1" name=""/>
+        <p:cNvGrpSpPr/>
+        <p:nvPr/>
+      </p:nvGrpSpPr>
+      <p:grpSpPr>
+        <a:xfrm>
+          <a:off x="0" y="0"/>
+          <a:ext cx="0" cy="0"/>
+          <a:chOff x="0" y="0"/>
+          <a:chExt cx="0" cy="0"/>
+        </a:xfrm>
+      </p:grpSpPr>
+      <p:sp>
+        <p:nvSpPr>
+          <p:cNvPr id="2" name="Title 1">
+            <a:extLst>
+              <a:ext uri="{FF2B5EF4-FFF2-40B4-BE49-F238E27FC236}">
+                <a16:creationId xmlns:a16="http://schemas.microsoft.com/office/drawing/2014/main" id="{0AF7CBA0-6AF4-BD4F-324F-2D6889883F56}"/>
+              </a:ext>
+            </a:extLst>
+          </p:cNvPr>
+          <p:cNvSpPr>
+            <a:spLocks noGrp="1"/>
+          </p:cNvSpPr>
+          <p:nvPr>
+            <p:ph type="title"/>
+          </p:nvPr>
+        </p:nvSpPr>
+        <p:spPr/>
+        <p:txBody>
+          <a:bodyPr/>
+          <a:lstStyle/>
+          <a:p>
+            <a:r>
+              <a:rPr lang="en-US" dirty="0"/>
+              <a:t>Conditional Statements</a:t>
+            </a:r>
+            <a:endParaRPr lang="en-GB" dirty="0"/>
+          </a:p>
+        </p:txBody>
+      </p:sp>
+      <p:sp>
+        <p:nvSpPr>
+          <p:cNvPr id="3" name="Content Placeholder 2">
+            <a:extLst>
+              <a:ext uri="{FF2B5EF4-FFF2-40B4-BE49-F238E27FC236}">
+                <a16:creationId xmlns:a16="http://schemas.microsoft.com/office/drawing/2014/main" id="{1B8975F3-0DD1-5FD5-27A8-995AE0C37A2C}"/>
+              </a:ext>
+            </a:extLst>
+          </p:cNvPr>
+          <p:cNvSpPr>
+            <a:spLocks noGrp="1"/>
+          </p:cNvSpPr>
+          <p:nvPr>
+            <p:ph idx="1"/>
+          </p:nvPr>
+        </p:nvSpPr>
+        <p:spPr/>
+        <p:txBody>
+          <a:bodyPr>
+            <a:normAutofit fontScale="77500" lnSpcReduction="20000"/>
+          </a:bodyPr>
+          <a:lstStyle/>
+          <a:p>
+            <a:r>
+              <a:rPr lang="en-US" b="0" i="0" dirty="0">
+                <a:solidFill>
+                  <a:srgbClr val="202124"/>
+                </a:solidFill>
+                <a:effectLst/>
+                <a:latin typeface="Google Sans"/>
+              </a:rPr>
+              <a:t>Conditional statements (if, else, and </a:t>
+            </a:r>
+            <a:r>
+              <a:rPr lang="en-US" b="0" i="0" dirty="0" err="1">
+                <a:solidFill>
+                  <a:srgbClr val="202124"/>
+                </a:solidFill>
+                <a:effectLst/>
+                <a:latin typeface="Google Sans"/>
+              </a:rPr>
+              <a:t>elif</a:t>
+            </a:r>
+            <a:r>
+              <a:rPr lang="en-US" b="0" i="0" dirty="0">
+                <a:solidFill>
+                  <a:srgbClr val="202124"/>
+                </a:solidFill>
+                <a:effectLst/>
+                <a:latin typeface="Google Sans"/>
+              </a:rPr>
+              <a:t>) are </a:t>
+            </a:r>
+            <a:r>
+              <a:rPr lang="en-US" b="0" i="0" dirty="0">
+                <a:solidFill>
+                  <a:srgbClr val="040C28"/>
+                </a:solidFill>
+                <a:effectLst/>
+                <a:latin typeface="Google Sans"/>
+              </a:rPr>
+              <a:t>fundamental programming constructs that allow you to control the flow of your program based on conditions that you specify</a:t>
+            </a:r>
+            <a:r>
+              <a:rPr lang="en-US" b="0" i="0" dirty="0">
+                <a:solidFill>
+                  <a:srgbClr val="202124"/>
+                </a:solidFill>
+                <a:effectLst/>
+                <a:latin typeface="Google Sans"/>
+              </a:rPr>
+              <a:t>. They provide a way to make decisions in your program and execute different code based on those decisions.</a:t>
+            </a:r>
+          </a:p>
+          <a:p>
+            <a:r>
+              <a:rPr lang="en-US" dirty="0"/>
+              <a:t>Here's an example of how to use an if-else statement to check if a number is positive or negative:</a:t>
+            </a:r>
+          </a:p>
+          <a:p>
+            <a:endParaRPr lang="en-US" dirty="0"/>
+          </a:p>
+          <a:p>
+            <a:r>
+              <a:rPr lang="en-US" dirty="0"/>
+              <a:t>num = -5</a:t>
+            </a:r>
+          </a:p>
+          <a:p>
+            <a:endParaRPr lang="en-US" dirty="0"/>
+          </a:p>
+          <a:p>
+            <a:r>
+              <a:rPr lang="en-US" dirty="0"/>
+              <a:t>if num &gt; 0:</a:t>
+            </a:r>
+          </a:p>
+          <a:p>
+            <a:pPr marL="0" indent="0">
+              <a:buNone/>
+            </a:pPr>
+            <a:r>
+              <a:rPr lang="en-US" dirty="0"/>
+              <a:t>        print("The number is positive.")</a:t>
+            </a:r>
+          </a:p>
+          <a:p>
+            <a:r>
+              <a:rPr lang="en-US" dirty="0"/>
+              <a:t>else:</a:t>
+            </a:r>
+          </a:p>
+          <a:p>
+            <a:pPr marL="0" indent="0">
+              <a:buNone/>
+            </a:pPr>
+            <a:r>
+              <a:rPr lang="en-US" dirty="0"/>
+              <a:t>        print("The number is negative.")</a:t>
+            </a:r>
+            <a:endParaRPr lang="en-GB" dirty="0"/>
+          </a:p>
+        </p:txBody>
+      </p:sp>
+    </p:spTree>
+    <p:extLst>
+      <p:ext uri="{BB962C8B-B14F-4D97-AF65-F5344CB8AC3E}">
+        <p14:creationId xmlns:p14="http://schemas.microsoft.com/office/powerpoint/2010/main" val="692835320"/>
+      </p:ext>
+    </p:extLst>
+  </p:cSld>
+  <p:clrMapOvr>
+    <a:masterClrMapping/>
+  </p:clrMapOvr>
+</p:sld>
+</file>
+
+<file path=ppt/slides/slide13.xml><?xml version="1.0" encoding="utf-8"?>
+<p:sld xmlns:a="http://schemas.openxmlformats.org/drawingml/2006/main" xmlns:r="http://schemas.openxmlformats.org/officeDocument/2006/relationships" xmlns:p="http://schemas.openxmlformats.org/presentationml/2006/main">
+  <p:cSld>
+    <p:spTree>
+      <p:nvGrpSpPr>
+        <p:cNvPr id="1" name=""/>
+        <p:cNvGrpSpPr/>
+        <p:nvPr/>
+      </p:nvGrpSpPr>
+      <p:grpSpPr>
+        <a:xfrm>
+          <a:off x="0" y="0"/>
+          <a:ext cx="0" cy="0"/>
+          <a:chOff x="0" y="0"/>
+          <a:chExt cx="0" cy="0"/>
+        </a:xfrm>
+      </p:grpSpPr>
+      <p:sp>
+        <p:nvSpPr>
+          <p:cNvPr id="2" name="Title 1">
+            <a:extLst>
+              <a:ext uri="{FF2B5EF4-FFF2-40B4-BE49-F238E27FC236}">
+                <a16:creationId xmlns:a16="http://schemas.microsoft.com/office/drawing/2014/main" id="{5A6AFD41-B15B-6226-65EE-73897DCED782}"/>
+              </a:ext>
+            </a:extLst>
+          </p:cNvPr>
+          <p:cNvSpPr>
+            <a:spLocks noGrp="1"/>
+          </p:cNvSpPr>
+          <p:nvPr>
+            <p:ph type="title"/>
+          </p:nvPr>
+        </p:nvSpPr>
+        <p:spPr/>
+        <p:txBody>
+          <a:bodyPr/>
+          <a:lstStyle/>
+          <a:p>
+            <a:r>
+              <a:rPr lang="en-US" dirty="0"/>
+              <a:t>Loops in Python </a:t>
+            </a:r>
+            <a:endParaRPr lang="en-GB" dirty="0"/>
+          </a:p>
+        </p:txBody>
+      </p:sp>
+      <p:sp>
+        <p:nvSpPr>
+          <p:cNvPr id="3" name="Content Placeholder 2">
+            <a:extLst>
+              <a:ext uri="{FF2B5EF4-FFF2-40B4-BE49-F238E27FC236}">
+                <a16:creationId xmlns:a16="http://schemas.microsoft.com/office/drawing/2014/main" id="{52E68175-DDFA-2AFF-8E57-E5094AE10758}"/>
+              </a:ext>
+            </a:extLst>
+          </p:cNvPr>
+          <p:cNvSpPr>
+            <a:spLocks noGrp="1"/>
+          </p:cNvSpPr>
+          <p:nvPr>
+            <p:ph idx="1"/>
+          </p:nvPr>
+        </p:nvSpPr>
+        <p:spPr/>
+        <p:txBody>
+          <a:bodyPr>
+            <a:normAutofit fontScale="55000" lnSpcReduction="20000"/>
+          </a:bodyPr>
+          <a:lstStyle/>
+          <a:p>
+            <a:pPr marL="0" indent="0">
+              <a:buNone/>
+            </a:pPr>
+            <a:r>
+              <a:rPr lang="en-US" b="0" i="0" dirty="0">
+                <a:solidFill>
+                  <a:srgbClr val="4D5156"/>
+                </a:solidFill>
+                <a:effectLst/>
+                <a:latin typeface="Google Sans"/>
+              </a:rPr>
+              <a:t>There are two types of loops in python: for loop and while loop. For loops are used to iterate over a data structure or sequence of elements, such as a list, string, or dictionary, and execute a block of code for each element in the sequence.</a:t>
+            </a:r>
+          </a:p>
+          <a:p>
+            <a:pPr marL="0" indent="0">
+              <a:buNone/>
+            </a:pPr>
+            <a:r>
+              <a:rPr lang="en-US" b="1" dirty="0"/>
+              <a:t>While Loop in Python</a:t>
+            </a:r>
+          </a:p>
+          <a:p>
+            <a:pPr marL="0" indent="0">
+              <a:buNone/>
+            </a:pPr>
+            <a:r>
+              <a:rPr lang="en-US" dirty="0"/>
+              <a:t>In Python, a while loop is used to execute a block of statements repeatedly until a given condition is satisfied. When the condition becomes false, the line immediately after the loop in the program is executed.</a:t>
+            </a:r>
+          </a:p>
+          <a:p>
+            <a:endParaRPr lang="en-US" dirty="0"/>
+          </a:p>
+          <a:p>
+            <a:pPr marL="0" indent="0">
+              <a:buNone/>
+            </a:pPr>
+            <a:r>
+              <a:rPr lang="en-US" dirty="0">
+                <a:latin typeface="Arial Narrow" panose="020B0606020202030204" pitchFamily="34" charset="0"/>
+              </a:rPr>
+              <a:t>While Loop Syntax:</a:t>
+            </a:r>
+          </a:p>
+          <a:p>
+            <a:pPr marL="0" indent="0">
+              <a:buNone/>
+            </a:pPr>
+            <a:r>
+              <a:rPr lang="en-US" dirty="0">
+                <a:latin typeface="Arial Narrow" panose="020B0606020202030204" pitchFamily="34" charset="0"/>
+              </a:rPr>
+              <a:t>          while expression:</a:t>
+            </a:r>
+          </a:p>
+          <a:p>
+            <a:pPr marL="0" indent="0">
+              <a:buNone/>
+            </a:pPr>
+            <a:r>
+              <a:rPr lang="en-US" dirty="0">
+                <a:latin typeface="Arial Narrow" panose="020B0606020202030204" pitchFamily="34" charset="0"/>
+              </a:rPr>
+              <a:t>                 statement(s)</a:t>
+            </a:r>
+          </a:p>
+          <a:p>
+            <a:pPr marL="0" indent="0">
+              <a:buNone/>
+            </a:pPr>
+            <a:r>
+              <a:rPr lang="en-US" b="1" dirty="0"/>
+              <a:t>For Loops</a:t>
+            </a:r>
+          </a:p>
+          <a:p>
+            <a:pPr marL="0" indent="0">
+              <a:buNone/>
+            </a:pPr>
+            <a:r>
+              <a:rPr lang="en-US" dirty="0"/>
+              <a:t>For loops are used for sequential traversal. For example: traversing a list or string or array etc. In Python, there is “for in” loop which is similar to foreach loop in other languages. Let us learn how to use for loop in Python for sequential traversals with </a:t>
+            </a:r>
+            <a:r>
+              <a:rPr lang="en-US"/>
+              <a:t>examples.</a:t>
+            </a:r>
+          </a:p>
+          <a:p>
+            <a:pPr marL="0" indent="0">
+              <a:buNone/>
+            </a:pPr>
+            <a:endParaRPr lang="en-US" dirty="0"/>
+          </a:p>
+          <a:p>
+            <a:pPr marL="0" indent="0">
+              <a:buNone/>
+            </a:pPr>
+            <a:r>
+              <a:rPr lang="en-US" dirty="0">
+                <a:latin typeface="Arial Narrow" panose="020B0606020202030204" pitchFamily="34" charset="0"/>
+              </a:rPr>
+              <a:t>For Loop Syntax:</a:t>
+            </a:r>
+          </a:p>
+          <a:p>
+            <a:pPr marL="0" indent="0">
+              <a:buNone/>
+            </a:pPr>
+            <a:r>
+              <a:rPr lang="en-US" dirty="0">
+                <a:latin typeface="Arial Narrow" panose="020B0606020202030204" pitchFamily="34" charset="0"/>
+              </a:rPr>
+              <a:t>         for </a:t>
+            </a:r>
+            <a:r>
+              <a:rPr lang="en-US" dirty="0" err="1">
+                <a:latin typeface="Arial Narrow" panose="020B0606020202030204" pitchFamily="34" charset="0"/>
+              </a:rPr>
+              <a:t>iterator_var</a:t>
+            </a:r>
+            <a:r>
+              <a:rPr lang="en-US" dirty="0">
+                <a:latin typeface="Arial Narrow" panose="020B0606020202030204" pitchFamily="34" charset="0"/>
+              </a:rPr>
+              <a:t> in sequence:</a:t>
+            </a:r>
+          </a:p>
+          <a:p>
+            <a:pPr marL="0" indent="0">
+              <a:buNone/>
+            </a:pPr>
+            <a:r>
+              <a:rPr lang="en-US" dirty="0">
+                <a:latin typeface="Arial Narrow" panose="020B0606020202030204" pitchFamily="34" charset="0"/>
+              </a:rPr>
+              <a:t>                        statements(s)</a:t>
+            </a:r>
+          </a:p>
+          <a:p>
+            <a:pPr marL="0" indent="0">
+              <a:buNone/>
+            </a:pPr>
+            <a:endParaRPr lang="en-US" dirty="0"/>
+          </a:p>
+          <a:p>
+            <a:pPr marL="0" indent="0">
+              <a:buNone/>
+            </a:pPr>
+            <a:endParaRPr lang="en-GB" dirty="0"/>
+          </a:p>
+        </p:txBody>
+      </p:sp>
+    </p:spTree>
+    <p:extLst>
+      <p:ext uri="{BB962C8B-B14F-4D97-AF65-F5344CB8AC3E}">
+        <p14:creationId xmlns:p14="http://schemas.microsoft.com/office/powerpoint/2010/main" val="2509201695"/>
+      </p:ext>
+    </p:extLst>
+  </p:cSld>
+  <p:clrMapOvr>
+    <a:masterClrMapping/>
+  </p:clrMapOvr>
+</p:sld>
+</file>
+
 <file path=ppt/slides/slide2.xml><?xml version="1.0" encoding="utf-8"?>
 <p:sld xmlns:a="http://schemas.openxmlformats.org/drawingml/2006/main" xmlns:r="http://schemas.openxmlformats.org/officeDocument/2006/relationships" xmlns:p="http://schemas.openxmlformats.org/presentationml/2006/main">
   <p:cSld>

</xml_diff>

<commit_message>
weekly action points week 3 update and modules section added on ppt
</commit_message>
<xml_diff>
--- a/Python_Training_XXXXXX_V1.pptx
+++ b/Python_Training_XXXXXX_V1.pptx
@@ -18,6 +18,8 @@
     <p:sldId id="266" r:id="rId12"/>
     <p:sldId id="267" r:id="rId13"/>
     <p:sldId id="268" r:id="rId14"/>
+    <p:sldId id="269" r:id="rId15"/>
+    <p:sldId id="270" r:id="rId16"/>
   </p:sldIdLst>
   <p:sldSz cx="12192000" cy="6858000"/>
   <p:notesSz cx="6858000" cy="9144000"/>
@@ -127,7 +129,7 @@
 <file path=ppt/revisionInfo.xml><?xml version="1.0" encoding="utf-8"?>
 <p1510:revInfo xmlns:a="http://schemas.openxmlformats.org/drawingml/2006/main" xmlns:r="http://schemas.openxmlformats.org/officeDocument/2006/relationships" xmlns:p1510="http://schemas.microsoft.com/office/powerpoint/2015/10/main">
   <p1510:revLst>
-    <p1510:client id="{072CD353-33CC-4253-AE63-82F7FD1B1DC8}" v="28" dt="2024-02-23T14:30:54.461"/>
+    <p1510:client id="{072CD353-33CC-4253-AE63-82F7FD1B1DC8}" v="38" dt="2024-02-27T15:33:00.358"/>
   </p1510:revLst>
 </p1510:revInfo>
 </file>
@@ -176,7 +178,7 @@
   <pc:docChgLst>
     <pc:chgData name="Moro, Marco" userId="d7bcd177-0ddd-42e9-8665-046e17e9d9ac" providerId="ADAL" clId="{072CD353-33CC-4253-AE63-82F7FD1B1DC8}"/>
     <pc:docChg chg="undo custSel addSld delSld modSld">
-      <pc:chgData name="Moro, Marco" userId="d7bcd177-0ddd-42e9-8665-046e17e9d9ac" providerId="ADAL" clId="{072CD353-33CC-4253-AE63-82F7FD1B1DC8}" dt="2024-02-23T14:34:17.291" v="624" actId="20577"/>
+      <pc:chgData name="Moro, Marco" userId="d7bcd177-0ddd-42e9-8665-046e17e9d9ac" providerId="ADAL" clId="{072CD353-33CC-4253-AE63-82F7FD1B1DC8}" dt="2024-02-27T15:42:55.481" v="1400"/>
       <pc:docMkLst>
         <pc:docMk/>
       </pc:docMkLst>
@@ -425,6 +427,68 @@
           </ac:spMkLst>
         </pc:spChg>
       </pc:sldChg>
+      <pc:sldChg chg="addSp delSp modSp new mod">
+        <pc:chgData name="Moro, Marco" userId="d7bcd177-0ddd-42e9-8665-046e17e9d9ac" providerId="ADAL" clId="{072CD353-33CC-4253-AE63-82F7FD1B1DC8}" dt="2024-02-27T15:42:55.481" v="1400"/>
+        <pc:sldMkLst>
+          <pc:docMk/>
+          <pc:sldMk cId="1515574987" sldId="269"/>
+        </pc:sldMkLst>
+        <pc:spChg chg="mod">
+          <ac:chgData name="Moro, Marco" userId="d7bcd177-0ddd-42e9-8665-046e17e9d9ac" providerId="ADAL" clId="{072CD353-33CC-4253-AE63-82F7FD1B1DC8}" dt="2024-02-27T15:16:43.094" v="643" actId="20577"/>
+          <ac:spMkLst>
+            <pc:docMk/>
+            <pc:sldMk cId="1515574987" sldId="269"/>
+            <ac:spMk id="2" creationId="{3AFCB31E-B04C-F72A-9232-2AD2F70687E4}"/>
+          </ac:spMkLst>
+        </pc:spChg>
+        <pc:spChg chg="add del mod">
+          <ac:chgData name="Moro, Marco" userId="d7bcd177-0ddd-42e9-8665-046e17e9d9ac" providerId="ADAL" clId="{072CD353-33CC-4253-AE63-82F7FD1B1DC8}" dt="2024-02-27T15:42:55.481" v="1400"/>
+          <ac:spMkLst>
+            <pc:docMk/>
+            <pc:sldMk cId="1515574987" sldId="269"/>
+            <ac:spMk id="3" creationId="{63842D7C-BA69-0475-2FE0-5888C332C339}"/>
+          </ac:spMkLst>
+        </pc:spChg>
+        <pc:spChg chg="add del mod">
+          <ac:chgData name="Moro, Marco" userId="d7bcd177-0ddd-42e9-8665-046e17e9d9ac" providerId="ADAL" clId="{072CD353-33CC-4253-AE63-82F7FD1B1DC8}" dt="2024-02-27T15:17:22.127" v="645"/>
+          <ac:spMkLst>
+            <pc:docMk/>
+            <pc:sldMk cId="1515574987" sldId="269"/>
+            <ac:spMk id="4" creationId="{DB58E187-CEDD-B33E-2DC8-0CBAE14DF329}"/>
+          </ac:spMkLst>
+        </pc:spChg>
+      </pc:sldChg>
+      <pc:sldChg chg="addSp delSp modSp new mod">
+        <pc:chgData name="Moro, Marco" userId="d7bcd177-0ddd-42e9-8665-046e17e9d9ac" providerId="ADAL" clId="{072CD353-33CC-4253-AE63-82F7FD1B1DC8}" dt="2024-02-27T15:40:06.722" v="1379" actId="20577"/>
+        <pc:sldMkLst>
+          <pc:docMk/>
+          <pc:sldMk cId="3478121158" sldId="270"/>
+        </pc:sldMkLst>
+        <pc:spChg chg="mod">
+          <ac:chgData name="Moro, Marco" userId="d7bcd177-0ddd-42e9-8665-046e17e9d9ac" providerId="ADAL" clId="{072CD353-33CC-4253-AE63-82F7FD1B1DC8}" dt="2024-02-27T15:22:24.943" v="883" actId="20577"/>
+          <ac:spMkLst>
+            <pc:docMk/>
+            <pc:sldMk cId="3478121158" sldId="270"/>
+            <ac:spMk id="2" creationId="{DCD35642-711E-4789-C88D-7B48C28B4EF6}"/>
+          </ac:spMkLst>
+        </pc:spChg>
+        <pc:spChg chg="mod">
+          <ac:chgData name="Moro, Marco" userId="d7bcd177-0ddd-42e9-8665-046e17e9d9ac" providerId="ADAL" clId="{072CD353-33CC-4253-AE63-82F7FD1B1DC8}" dt="2024-02-27T15:40:06.722" v="1379" actId="20577"/>
+          <ac:spMkLst>
+            <pc:docMk/>
+            <pc:sldMk cId="3478121158" sldId="270"/>
+            <ac:spMk id="3" creationId="{BEE40C78-1E34-0DC6-9917-60ADD44CF667}"/>
+          </ac:spMkLst>
+        </pc:spChg>
+        <pc:spChg chg="add del">
+          <ac:chgData name="Moro, Marco" userId="d7bcd177-0ddd-42e9-8665-046e17e9d9ac" providerId="ADAL" clId="{072CD353-33CC-4253-AE63-82F7FD1B1DC8}" dt="2024-02-27T15:32:57.691" v="1285"/>
+          <ac:spMkLst>
+            <pc:docMk/>
+            <pc:sldMk cId="3478121158" sldId="270"/>
+            <ac:spMk id="4" creationId="{D7681195-96F8-779F-0E77-F95015DC561D}"/>
+          </ac:spMkLst>
+        </pc:spChg>
+      </pc:sldChg>
     </pc:docChg>
   </pc:docChgLst>
 </pc:chgInfo>
@@ -579,7 +643,7 @@
           <a:p>
             <a:fld id="{3D8FED83-86F4-482A-91F0-A1EF509DC55C}" type="datetimeFigureOut">
               <a:rPr lang="en-GB" smtClean="0"/>
-              <a:t>22/02/2024</a:t>
+              <a:t>27/02/2024</a:t>
             </a:fld>
             <a:endParaRPr lang="en-GB"/>
           </a:p>
@@ -779,7 +843,7 @@
           <a:p>
             <a:fld id="{3D8FED83-86F4-482A-91F0-A1EF509DC55C}" type="datetimeFigureOut">
               <a:rPr lang="en-GB" smtClean="0"/>
-              <a:t>22/02/2024</a:t>
+              <a:t>27/02/2024</a:t>
             </a:fld>
             <a:endParaRPr lang="en-GB"/>
           </a:p>
@@ -989,7 +1053,7 @@
           <a:p>
             <a:fld id="{3D8FED83-86F4-482A-91F0-A1EF509DC55C}" type="datetimeFigureOut">
               <a:rPr lang="en-GB" smtClean="0"/>
-              <a:t>22/02/2024</a:t>
+              <a:t>27/02/2024</a:t>
             </a:fld>
             <a:endParaRPr lang="en-GB"/>
           </a:p>
@@ -1189,7 +1253,7 @@
           <a:p>
             <a:fld id="{3D8FED83-86F4-482A-91F0-A1EF509DC55C}" type="datetimeFigureOut">
               <a:rPr lang="en-GB" smtClean="0"/>
-              <a:t>22/02/2024</a:t>
+              <a:t>27/02/2024</a:t>
             </a:fld>
             <a:endParaRPr lang="en-GB"/>
           </a:p>
@@ -1465,7 +1529,7 @@
           <a:p>
             <a:fld id="{3D8FED83-86F4-482A-91F0-A1EF509DC55C}" type="datetimeFigureOut">
               <a:rPr lang="en-GB" smtClean="0"/>
-              <a:t>22/02/2024</a:t>
+              <a:t>27/02/2024</a:t>
             </a:fld>
             <a:endParaRPr lang="en-GB"/>
           </a:p>
@@ -1733,7 +1797,7 @@
           <a:p>
             <a:fld id="{3D8FED83-86F4-482A-91F0-A1EF509DC55C}" type="datetimeFigureOut">
               <a:rPr lang="en-GB" smtClean="0"/>
-              <a:t>22/02/2024</a:t>
+              <a:t>27/02/2024</a:t>
             </a:fld>
             <a:endParaRPr lang="en-GB"/>
           </a:p>
@@ -2148,7 +2212,7 @@
           <a:p>
             <a:fld id="{3D8FED83-86F4-482A-91F0-A1EF509DC55C}" type="datetimeFigureOut">
               <a:rPr lang="en-GB" smtClean="0"/>
-              <a:t>22/02/2024</a:t>
+              <a:t>27/02/2024</a:t>
             </a:fld>
             <a:endParaRPr lang="en-GB"/>
           </a:p>
@@ -2290,7 +2354,7 @@
           <a:p>
             <a:fld id="{3D8FED83-86F4-482A-91F0-A1EF509DC55C}" type="datetimeFigureOut">
               <a:rPr lang="en-GB" smtClean="0"/>
-              <a:t>22/02/2024</a:t>
+              <a:t>27/02/2024</a:t>
             </a:fld>
             <a:endParaRPr lang="en-GB"/>
           </a:p>
@@ -2403,7 +2467,7 @@
           <a:p>
             <a:fld id="{3D8FED83-86F4-482A-91F0-A1EF509DC55C}" type="datetimeFigureOut">
               <a:rPr lang="en-GB" smtClean="0"/>
-              <a:t>22/02/2024</a:t>
+              <a:t>27/02/2024</a:t>
             </a:fld>
             <a:endParaRPr lang="en-GB"/>
           </a:p>
@@ -2716,7 +2780,7 @@
           <a:p>
             <a:fld id="{3D8FED83-86F4-482A-91F0-A1EF509DC55C}" type="datetimeFigureOut">
               <a:rPr lang="en-GB" smtClean="0"/>
-              <a:t>22/02/2024</a:t>
+              <a:t>27/02/2024</a:t>
             </a:fld>
             <a:endParaRPr lang="en-GB"/>
           </a:p>
@@ -3005,7 +3069,7 @@
           <a:p>
             <a:fld id="{3D8FED83-86F4-482A-91F0-A1EF509DC55C}" type="datetimeFigureOut">
               <a:rPr lang="en-GB" smtClean="0"/>
-              <a:t>22/02/2024</a:t>
+              <a:t>27/02/2024</a:t>
             </a:fld>
             <a:endParaRPr lang="en-GB"/>
           </a:p>
@@ -3248,7 +3312,7 @@
           <a:p>
             <a:fld id="{3D8FED83-86F4-482A-91F0-A1EF509DC55C}" type="datetimeFigureOut">
               <a:rPr lang="en-GB" smtClean="0"/>
-              <a:t>22/02/2024</a:t>
+              <a:t>27/02/2024</a:t>
             </a:fld>
             <a:endParaRPr lang="en-GB"/>
           </a:p>
@@ -11663,6 +11727,396 @@
 </p:sld>
 </file>
 
+<file path=ppt/slides/slide14.xml><?xml version="1.0" encoding="utf-8"?>
+<p:sld xmlns:a="http://schemas.openxmlformats.org/drawingml/2006/main" xmlns:r="http://schemas.openxmlformats.org/officeDocument/2006/relationships" xmlns:p="http://schemas.openxmlformats.org/presentationml/2006/main">
+  <p:cSld>
+    <p:spTree>
+      <p:nvGrpSpPr>
+        <p:cNvPr id="1" name=""/>
+        <p:cNvGrpSpPr/>
+        <p:nvPr/>
+      </p:nvGrpSpPr>
+      <p:grpSpPr>
+        <a:xfrm>
+          <a:off x="0" y="0"/>
+          <a:ext cx="0" cy="0"/>
+          <a:chOff x="0" y="0"/>
+          <a:chExt cx="0" cy="0"/>
+        </a:xfrm>
+      </p:grpSpPr>
+      <p:sp>
+        <p:nvSpPr>
+          <p:cNvPr id="2" name="Title 1">
+            <a:extLst>
+              <a:ext uri="{FF2B5EF4-FFF2-40B4-BE49-F238E27FC236}">
+                <a16:creationId xmlns:a16="http://schemas.microsoft.com/office/drawing/2014/main" id="{3AFCB31E-B04C-F72A-9232-2AD2F70687E4}"/>
+              </a:ext>
+            </a:extLst>
+          </p:cNvPr>
+          <p:cNvSpPr>
+            <a:spLocks noGrp="1"/>
+          </p:cNvSpPr>
+          <p:nvPr>
+            <p:ph type="title"/>
+          </p:nvPr>
+        </p:nvSpPr>
+        <p:spPr/>
+        <p:txBody>
+          <a:bodyPr/>
+          <a:lstStyle/>
+          <a:p>
+            <a:r>
+              <a:rPr lang="en-US" dirty="0"/>
+              <a:t>Modules in Python </a:t>
+            </a:r>
+            <a:endParaRPr lang="en-GB" dirty="0"/>
+          </a:p>
+        </p:txBody>
+      </p:sp>
+      <p:sp>
+        <p:nvSpPr>
+          <p:cNvPr id="3" name="Content Placeholder 2">
+            <a:extLst>
+              <a:ext uri="{FF2B5EF4-FFF2-40B4-BE49-F238E27FC236}">
+                <a16:creationId xmlns:a16="http://schemas.microsoft.com/office/drawing/2014/main" id="{63842D7C-BA69-0475-2FE0-5888C332C339}"/>
+              </a:ext>
+            </a:extLst>
+          </p:cNvPr>
+          <p:cNvSpPr>
+            <a:spLocks noGrp="1"/>
+          </p:cNvSpPr>
+          <p:nvPr>
+            <p:ph idx="1"/>
+          </p:nvPr>
+        </p:nvSpPr>
+        <p:spPr/>
+        <p:txBody>
+          <a:bodyPr>
+            <a:normAutofit fontScale="92500" lnSpcReduction="10000"/>
+          </a:bodyPr>
+          <a:lstStyle/>
+          <a:p>
+            <a:r>
+              <a:rPr lang="en-US" dirty="0"/>
+              <a:t>module is a file containing python definitions and statements, that means a module contains python class, functions and variables.</a:t>
+            </a:r>
+          </a:p>
+          <a:p>
+            <a:r>
+              <a:rPr lang="en-US" dirty="0"/>
+              <a:t>a module can help to compile your code by reusing already defined logics for specific features you want to develop</a:t>
+            </a:r>
+          </a:p>
+          <a:p>
+            <a:r>
+              <a:rPr lang="en-US" dirty="0"/>
+              <a:t>the key word "import + module name " give you access to predefined classes, functions and variables defined in modules’</a:t>
+            </a:r>
+          </a:p>
+          <a:p>
+            <a:r>
+              <a:rPr lang="en-US" dirty="0"/>
+              <a:t>In python we already have pre-defined modules ( access them with “help(“modules”) they are called default modules </a:t>
+            </a:r>
+          </a:p>
+          <a:p>
+            <a:r>
+              <a:rPr lang="en-US" dirty="0"/>
+              <a:t>External modules are called third party modules and they can be </a:t>
+            </a:r>
+            <a:r>
+              <a:rPr lang="en-US" dirty="0" err="1"/>
+              <a:t>dowloanded</a:t>
+            </a:r>
+            <a:r>
+              <a:rPr lang="en-US" dirty="0"/>
+              <a:t> by using pip </a:t>
+            </a:r>
+          </a:p>
+          <a:p>
+            <a:r>
+              <a:rPr lang="en-US" dirty="0"/>
+              <a:t>Documentation @ https://docs.python.org/3/py-modindex.html</a:t>
+            </a:r>
+          </a:p>
+        </p:txBody>
+      </p:sp>
+    </p:spTree>
+    <p:extLst>
+      <p:ext uri="{BB962C8B-B14F-4D97-AF65-F5344CB8AC3E}">
+        <p14:creationId xmlns:p14="http://schemas.microsoft.com/office/powerpoint/2010/main" val="1515574987"/>
+      </p:ext>
+    </p:extLst>
+  </p:cSld>
+  <p:clrMapOvr>
+    <a:masterClrMapping/>
+  </p:clrMapOvr>
+</p:sld>
+</file>
+
+<file path=ppt/slides/slide15.xml><?xml version="1.0" encoding="utf-8"?>
+<p:sld xmlns:a="http://schemas.openxmlformats.org/drawingml/2006/main" xmlns:r="http://schemas.openxmlformats.org/officeDocument/2006/relationships" xmlns:p="http://schemas.openxmlformats.org/presentationml/2006/main">
+  <p:cSld>
+    <p:spTree>
+      <p:nvGrpSpPr>
+        <p:cNvPr id="1" name=""/>
+        <p:cNvGrpSpPr/>
+        <p:nvPr/>
+      </p:nvGrpSpPr>
+      <p:grpSpPr>
+        <a:xfrm>
+          <a:off x="0" y="0"/>
+          <a:ext cx="0" cy="0"/>
+          <a:chOff x="0" y="0"/>
+          <a:chExt cx="0" cy="0"/>
+        </a:xfrm>
+      </p:grpSpPr>
+      <p:sp>
+        <p:nvSpPr>
+          <p:cNvPr id="2" name="Title 1">
+            <a:extLst>
+              <a:ext uri="{FF2B5EF4-FFF2-40B4-BE49-F238E27FC236}">
+                <a16:creationId xmlns:a16="http://schemas.microsoft.com/office/drawing/2014/main" id="{DCD35642-711E-4789-C88D-7B48C28B4EF6}"/>
+              </a:ext>
+            </a:extLst>
+          </p:cNvPr>
+          <p:cNvSpPr>
+            <a:spLocks noGrp="1"/>
+          </p:cNvSpPr>
+          <p:nvPr>
+            <p:ph type="title"/>
+          </p:nvPr>
+        </p:nvSpPr>
+        <p:spPr/>
+        <p:txBody>
+          <a:bodyPr/>
+          <a:lstStyle/>
+          <a:p>
+            <a:r>
+              <a:rPr lang="en-US" dirty="0"/>
+              <a:t>Import Modules with Python </a:t>
+            </a:r>
+            <a:endParaRPr lang="en-GB" dirty="0"/>
+          </a:p>
+        </p:txBody>
+      </p:sp>
+      <p:sp>
+        <p:nvSpPr>
+          <p:cNvPr id="3" name="Content Placeholder 2">
+            <a:extLst>
+              <a:ext uri="{FF2B5EF4-FFF2-40B4-BE49-F238E27FC236}">
+                <a16:creationId xmlns:a16="http://schemas.microsoft.com/office/drawing/2014/main" id="{BEE40C78-1E34-0DC6-9917-60ADD44CF667}"/>
+              </a:ext>
+            </a:extLst>
+          </p:cNvPr>
+          <p:cNvSpPr>
+            <a:spLocks noGrp="1"/>
+          </p:cNvSpPr>
+          <p:nvPr>
+            <p:ph idx="1"/>
+          </p:nvPr>
+        </p:nvSpPr>
+        <p:spPr/>
+        <p:txBody>
+          <a:bodyPr>
+            <a:normAutofit fontScale="40000" lnSpcReduction="20000"/>
+          </a:bodyPr>
+          <a:lstStyle/>
+          <a:p>
+            <a:pPr marL="0" indent="0">
+              <a:buNone/>
+            </a:pPr>
+            <a:r>
+              <a:rPr lang="en-US" dirty="0"/>
+              <a:t>                                                    </a:t>
+            </a:r>
+          </a:p>
+          <a:p>
+            <a:pPr marL="0" indent="0">
+              <a:buNone/>
+            </a:pPr>
+            <a:r>
+              <a:rPr lang="en-US" dirty="0"/>
+              <a:t>import </a:t>
+            </a:r>
+            <a:r>
+              <a:rPr lang="en-US" dirty="0" err="1"/>
+              <a:t>modulename</a:t>
+            </a:r>
+            <a:r>
+              <a:rPr lang="en-US" dirty="0"/>
+              <a:t>    (to import all the content from the module </a:t>
+            </a:r>
+            <a:r>
+              <a:rPr lang="en-US" dirty="0" err="1"/>
+              <a:t>modulname</a:t>
+            </a:r>
+            <a:r>
+              <a:rPr lang="en-US" dirty="0"/>
+              <a:t> into the script  program )</a:t>
+            </a:r>
+          </a:p>
+          <a:p>
+            <a:pPr marL="0" indent="0">
+              <a:buNone/>
+            </a:pPr>
+            <a:r>
+              <a:rPr lang="en-US" dirty="0" err="1"/>
+              <a:t>modulname.modulevariable</a:t>
+            </a:r>
+            <a:r>
+              <a:rPr lang="en-US" dirty="0"/>
+              <a:t>)  ( to access the content type </a:t>
+            </a:r>
+            <a:r>
+              <a:rPr lang="en-US" dirty="0" err="1"/>
+              <a:t>modulename</a:t>
+            </a:r>
+            <a:r>
+              <a:rPr lang="en-US" dirty="0"/>
+              <a:t>."the name of what you want to access defined in module in this example </a:t>
+            </a:r>
+            <a:r>
+              <a:rPr lang="en-US" dirty="0" err="1"/>
+              <a:t>modulevariable</a:t>
+            </a:r>
+            <a:r>
+              <a:rPr lang="en-US" dirty="0"/>
+              <a:t>)</a:t>
+            </a:r>
+          </a:p>
+          <a:p>
+            <a:pPr marL="0" indent="0">
+              <a:buNone/>
+            </a:pPr>
+            <a:r>
+              <a:rPr lang="en-US" dirty="0"/>
+              <a:t> </a:t>
+            </a:r>
+          </a:p>
+          <a:p>
+            <a:pPr marL="0" indent="0">
+              <a:buNone/>
+            </a:pPr>
+            <a:r>
+              <a:rPr lang="en-US" dirty="0"/>
+              <a:t>                                                 ##### method - 1 direct import ########</a:t>
+            </a:r>
+          </a:p>
+          <a:p>
+            <a:r>
+              <a:rPr lang="en-US" dirty="0"/>
+              <a:t>from math import *    ( from math module import all by using star)</a:t>
+            </a:r>
+          </a:p>
+          <a:p>
+            <a:endParaRPr lang="en-US" dirty="0"/>
+          </a:p>
+          <a:p>
+            <a:r>
+              <a:rPr lang="en-US" dirty="0"/>
+              <a:t>print(pow(3,2))   (in this occasion you can access the functions pow directly without specifying module name first)</a:t>
+            </a:r>
+          </a:p>
+          <a:p>
+            <a:endParaRPr lang="en-US" dirty="0"/>
+          </a:p>
+          <a:p>
+            <a:pPr marL="0" indent="0">
+              <a:buNone/>
+            </a:pPr>
+            <a:r>
+              <a:rPr lang="en-US" dirty="0"/>
+              <a:t>                                ########## method 2 import only what is needed from module with “from” ########</a:t>
+            </a:r>
+          </a:p>
+          <a:p>
+            <a:r>
+              <a:rPr lang="en-US" dirty="0"/>
+              <a:t>from math import pow    (with the from import we are only importing power function needed from </a:t>
+            </a:r>
+            <a:r>
+              <a:rPr lang="en-US" dirty="0" err="1"/>
+              <a:t>maths</a:t>
+            </a:r>
+            <a:r>
+              <a:rPr lang="en-US" dirty="0"/>
+              <a:t>)</a:t>
+            </a:r>
+          </a:p>
+          <a:p>
+            <a:r>
+              <a:rPr lang="en-US" dirty="0"/>
+              <a:t>from math import </a:t>
+            </a:r>
+            <a:r>
+              <a:rPr lang="en-US" dirty="0" err="1"/>
+              <a:t>pi,pow</a:t>
+            </a:r>
+            <a:r>
+              <a:rPr lang="en-US" dirty="0"/>
+              <a:t>    (or we can import multiple functions together with single line)</a:t>
+            </a:r>
+          </a:p>
+          <a:p>
+            <a:endParaRPr lang="en-US" dirty="0"/>
+          </a:p>
+          <a:p>
+            <a:pPr marL="0" indent="0">
+              <a:buNone/>
+            </a:pPr>
+            <a:r>
+              <a:rPr lang="en-US" dirty="0"/>
+              <a:t>                                 ####### method 3 import as alias ######################################</a:t>
+            </a:r>
+          </a:p>
+          <a:p>
+            <a:r>
+              <a:rPr lang="en-US" dirty="0"/>
+              <a:t>import math as m   (you can create alias name and use the functions by using the alias names to simplify the code)</a:t>
+            </a:r>
+          </a:p>
+          <a:p>
+            <a:endParaRPr lang="en-US" dirty="0"/>
+          </a:p>
+          <a:p>
+            <a:r>
+              <a:rPr lang="en-US" dirty="0"/>
+              <a:t>print(</a:t>
+            </a:r>
+            <a:r>
+              <a:rPr lang="en-US" dirty="0" err="1"/>
+              <a:t>m.pow</a:t>
+            </a:r>
+            <a:r>
+              <a:rPr lang="en-US" dirty="0"/>
+              <a:t>(3,2))  (now you are using m in your script to access </a:t>
+            </a:r>
+            <a:r>
+              <a:rPr lang="en-US" dirty="0" err="1"/>
+              <a:t>maths</a:t>
+            </a:r>
+            <a:r>
+              <a:rPr lang="en-US" dirty="0"/>
+              <a:t> functions)</a:t>
+            </a:r>
+            <a:endParaRPr lang="en-GB" dirty="0"/>
+          </a:p>
+        </p:txBody>
+      </p:sp>
+    </p:spTree>
+    <p:extLst>
+      <p:ext uri="{BB962C8B-B14F-4D97-AF65-F5344CB8AC3E}">
+        <p14:creationId xmlns:p14="http://schemas.microsoft.com/office/powerpoint/2010/main" val="3478121158"/>
+      </p:ext>
+    </p:extLst>
+  </p:cSld>
+  <p:clrMapOvr>
+    <a:masterClrMapping/>
+  </p:clrMapOvr>
+</p:sld>
+</file>
+
 <file path=ppt/slides/slide2.xml><?xml version="1.0" encoding="utf-8"?>
 <p:sld xmlns:a="http://schemas.openxmlformats.org/drawingml/2006/main" xmlns:r="http://schemas.openxmlformats.org/officeDocument/2006/relationships" xmlns:p="http://schemas.openxmlformats.org/presentationml/2006/main">
   <p:cSld>

</xml_diff>